<commit_message>
revise propositional slides, add implies.pptx
</commit_message>
<xml_diff>
--- a/spring14/slidesS14/implies.pptx
+++ b/spring14/slidesS14/implies.pptx
@@ -6,10 +6,10 @@
     <p:sldMasterId id="2147483651" r:id="rId2"/>
   </p:sldMasterIdLst>
   <p:notesMasterIdLst>
-    <p:notesMasterId r:id="rId18"/>
+    <p:notesMasterId r:id="rId15"/>
   </p:notesMasterIdLst>
   <p:handoutMasterIdLst>
-    <p:handoutMasterId r:id="rId19"/>
+    <p:handoutMasterId r:id="rId16"/>
   </p:handoutMasterIdLst>
   <p:sldIdLst>
     <p:sldId id="392" r:id="rId3"/>
@@ -23,15 +23,12 @@
     <p:sldId id="485" r:id="rId11"/>
     <p:sldId id="486" r:id="rId12"/>
     <p:sldId id="487" r:id="rId13"/>
-    <p:sldId id="430" r:id="rId14"/>
-    <p:sldId id="431" r:id="rId15"/>
-    <p:sldId id="432" r:id="rId16"/>
-    <p:sldId id="433" r:id="rId17"/>
+    <p:sldId id="488" r:id="rId14"/>
   </p:sldIdLst>
   <p:sldSz cx="9144000" cy="6858000" type="screen4x3"/>
   <p:notesSz cx="7315200" cy="9601200"/>
   <p:custDataLst>
-    <p:tags r:id="rId21"/>
+    <p:tags r:id="rId18"/>
   </p:custDataLst>
   <p:defaultTextStyle>
     <a:defPPr>
@@ -921,252 +918,6 @@
 </p:notes>
 </file>
 
-<file path=ppt/notesSlides/notesSlide10.xml><?xml version="1.0" encoding="utf-8"?>
-<p:notes xmlns:a="http://schemas.openxmlformats.org/drawingml/2006/main" xmlns:r="http://schemas.openxmlformats.org/officeDocument/2006/relationships" xmlns:p="http://schemas.openxmlformats.org/presentationml/2006/main">
-  <p:cSld>
-    <p:spTree>
-      <p:nvGrpSpPr>
-        <p:cNvPr id="1" name=""/>
-        <p:cNvGrpSpPr/>
-        <p:nvPr/>
-      </p:nvGrpSpPr>
-      <p:grpSpPr>
-        <a:xfrm>
-          <a:off x="0" y="0"/>
-          <a:ext cx="0" cy="0"/>
-          <a:chOff x="0" y="0"/>
-          <a:chExt cx="0" cy="0"/>
-        </a:xfrm>
-      </p:grpSpPr>
-      <p:sp>
-        <p:nvSpPr>
-          <p:cNvPr id="2" name="Slide Image Placeholder 1"/>
-          <p:cNvSpPr>
-            <a:spLocks noGrp="1" noRot="1" noChangeAspect="1"/>
-          </p:cNvSpPr>
-          <p:nvPr>
-            <p:ph type="sldImg"/>
-          </p:nvPr>
-        </p:nvSpPr>
-        <p:spPr/>
-      </p:sp>
-      <p:sp>
-        <p:nvSpPr>
-          <p:cNvPr id="3" name="Notes Placeholder 2"/>
-          <p:cNvSpPr>
-            <a:spLocks noGrp="1"/>
-          </p:cNvSpPr>
-          <p:nvPr>
-            <p:ph type="body" idx="1"/>
-          </p:nvPr>
-        </p:nvSpPr>
-        <p:spPr/>
-        <p:txBody>
-          <a:bodyPr>
-            <a:normAutofit/>
-          </a:bodyPr>
-          <a:lstStyle/>
-          <a:p>
-            <a:endParaRPr lang="en-US"/>
-          </a:p>
-        </p:txBody>
-      </p:sp>
-      <p:sp>
-        <p:nvSpPr>
-          <p:cNvPr id="4" name="Slide Number Placeholder 3"/>
-          <p:cNvSpPr>
-            <a:spLocks noGrp="1"/>
-          </p:cNvSpPr>
-          <p:nvPr>
-            <p:ph type="sldNum" sz="quarter" idx="10"/>
-          </p:nvPr>
-        </p:nvSpPr>
-        <p:spPr/>
-        <p:txBody>
-          <a:bodyPr/>
-          <a:lstStyle/>
-          <a:p>
-            <a:fld id="{A02B9F3F-3042-489F-AF35-1A733968F079}" type="slidenum">
-              <a:rPr lang="en-US" smtClean="0"/>
-              <a:pPr/>
-              <a:t>13</a:t>
-            </a:fld>
-            <a:endParaRPr lang="en-US"/>
-          </a:p>
-        </p:txBody>
-      </p:sp>
-    </p:spTree>
-  </p:cSld>
-  <p:clrMapOvr>
-    <a:masterClrMapping/>
-  </p:clrMapOvr>
-</p:notes>
-</file>
-
-<file path=ppt/notesSlides/notesSlide11.xml><?xml version="1.0" encoding="utf-8"?>
-<p:notes xmlns:a="http://schemas.openxmlformats.org/drawingml/2006/main" xmlns:r="http://schemas.openxmlformats.org/officeDocument/2006/relationships" xmlns:p="http://schemas.openxmlformats.org/presentationml/2006/main">
-  <p:cSld>
-    <p:spTree>
-      <p:nvGrpSpPr>
-        <p:cNvPr id="1" name=""/>
-        <p:cNvGrpSpPr/>
-        <p:nvPr/>
-      </p:nvGrpSpPr>
-      <p:grpSpPr>
-        <a:xfrm>
-          <a:off x="0" y="0"/>
-          <a:ext cx="0" cy="0"/>
-          <a:chOff x="0" y="0"/>
-          <a:chExt cx="0" cy="0"/>
-        </a:xfrm>
-      </p:grpSpPr>
-      <p:sp>
-        <p:nvSpPr>
-          <p:cNvPr id="2" name="Slide Image Placeholder 1"/>
-          <p:cNvSpPr>
-            <a:spLocks noGrp="1" noRot="1" noChangeAspect="1"/>
-          </p:cNvSpPr>
-          <p:nvPr>
-            <p:ph type="sldImg"/>
-          </p:nvPr>
-        </p:nvSpPr>
-        <p:spPr/>
-      </p:sp>
-      <p:sp>
-        <p:nvSpPr>
-          <p:cNvPr id="3" name="Notes Placeholder 2"/>
-          <p:cNvSpPr>
-            <a:spLocks noGrp="1"/>
-          </p:cNvSpPr>
-          <p:nvPr>
-            <p:ph type="body" idx="1"/>
-          </p:nvPr>
-        </p:nvSpPr>
-        <p:spPr/>
-        <p:txBody>
-          <a:bodyPr>
-            <a:normAutofit/>
-          </a:bodyPr>
-          <a:lstStyle/>
-          <a:p>
-            <a:endParaRPr lang="en-US"/>
-          </a:p>
-        </p:txBody>
-      </p:sp>
-      <p:sp>
-        <p:nvSpPr>
-          <p:cNvPr id="4" name="Slide Number Placeholder 3"/>
-          <p:cNvSpPr>
-            <a:spLocks noGrp="1"/>
-          </p:cNvSpPr>
-          <p:nvPr>
-            <p:ph type="sldNum" sz="quarter" idx="10"/>
-          </p:nvPr>
-        </p:nvSpPr>
-        <p:spPr/>
-        <p:txBody>
-          <a:bodyPr/>
-          <a:lstStyle/>
-          <a:p>
-            <a:fld id="{A02B9F3F-3042-489F-AF35-1A733968F079}" type="slidenum">
-              <a:rPr lang="en-US" smtClean="0"/>
-              <a:pPr/>
-              <a:t>14</a:t>
-            </a:fld>
-            <a:endParaRPr lang="en-US"/>
-          </a:p>
-        </p:txBody>
-      </p:sp>
-    </p:spTree>
-  </p:cSld>
-  <p:clrMapOvr>
-    <a:masterClrMapping/>
-  </p:clrMapOvr>
-</p:notes>
-</file>
-
-<file path=ppt/notesSlides/notesSlide12.xml><?xml version="1.0" encoding="utf-8"?>
-<p:notes xmlns:a="http://schemas.openxmlformats.org/drawingml/2006/main" xmlns:r="http://schemas.openxmlformats.org/officeDocument/2006/relationships" xmlns:p="http://schemas.openxmlformats.org/presentationml/2006/main">
-  <p:cSld>
-    <p:spTree>
-      <p:nvGrpSpPr>
-        <p:cNvPr id="1" name=""/>
-        <p:cNvGrpSpPr/>
-        <p:nvPr/>
-      </p:nvGrpSpPr>
-      <p:grpSpPr>
-        <a:xfrm>
-          <a:off x="0" y="0"/>
-          <a:ext cx="0" cy="0"/>
-          <a:chOff x="0" y="0"/>
-          <a:chExt cx="0" cy="0"/>
-        </a:xfrm>
-      </p:grpSpPr>
-      <p:sp>
-        <p:nvSpPr>
-          <p:cNvPr id="2" name="Slide Image Placeholder 1"/>
-          <p:cNvSpPr>
-            <a:spLocks noGrp="1" noRot="1" noChangeAspect="1"/>
-          </p:cNvSpPr>
-          <p:nvPr>
-            <p:ph type="sldImg"/>
-          </p:nvPr>
-        </p:nvSpPr>
-        <p:spPr/>
-      </p:sp>
-      <p:sp>
-        <p:nvSpPr>
-          <p:cNvPr id="3" name="Notes Placeholder 2"/>
-          <p:cNvSpPr>
-            <a:spLocks noGrp="1"/>
-          </p:cNvSpPr>
-          <p:nvPr>
-            <p:ph type="body" idx="1"/>
-          </p:nvPr>
-        </p:nvSpPr>
-        <p:spPr/>
-        <p:txBody>
-          <a:bodyPr>
-            <a:normAutofit/>
-          </a:bodyPr>
-          <a:lstStyle/>
-          <a:p>
-            <a:endParaRPr lang="en-US"/>
-          </a:p>
-        </p:txBody>
-      </p:sp>
-      <p:sp>
-        <p:nvSpPr>
-          <p:cNvPr id="4" name="Slide Number Placeholder 3"/>
-          <p:cNvSpPr>
-            <a:spLocks noGrp="1"/>
-          </p:cNvSpPr>
-          <p:nvPr>
-            <p:ph type="sldNum" sz="quarter" idx="10"/>
-          </p:nvPr>
-        </p:nvSpPr>
-        <p:spPr/>
-        <p:txBody>
-          <a:bodyPr/>
-          <a:lstStyle/>
-          <a:p>
-            <a:fld id="{A02B9F3F-3042-489F-AF35-1A733968F079}" type="slidenum">
-              <a:rPr lang="en-US" smtClean="0"/>
-              <a:pPr/>
-              <a:t>15</a:t>
-            </a:fld>
-            <a:endParaRPr lang="en-US"/>
-          </a:p>
-        </p:txBody>
-      </p:sp>
-    </p:spTree>
-  </p:cSld>
-  <p:clrMapOvr>
-    <a:masterClrMapping/>
-  </p:clrMapOvr>
-</p:notes>
-</file>
-
 <file path=ppt/notesSlides/notesSlide2.xml><?xml version="1.0" encoding="utf-8"?>
 <p:notes xmlns:a="http://schemas.openxmlformats.org/drawingml/2006/main" xmlns:r="http://schemas.openxmlformats.org/officeDocument/2006/relationships" xmlns:p="http://schemas.openxmlformats.org/presentationml/2006/main">
   <p:cSld>
@@ -2021,7 +1772,7 @@
   <p:clrMapOvr>
     <a:masterClrMapping/>
   </p:clrMapOvr>
-  <p:transition xmlns:p14="http://schemas.microsoft.com/office/powerpoint/2010/main">
+  <p:transition xmlns:p14="http://schemas.microsoft.com/office/powerpoint/2010/main" spd="slow" advClick="0">
     <p:fade/>
   </p:transition>
   <p:timing>
@@ -2152,7 +1903,7 @@
   <p:clrMapOvr>
     <a:masterClrMapping/>
   </p:clrMapOvr>
-  <p:transition xmlns:p14="http://schemas.microsoft.com/office/powerpoint/2010/main">
+  <p:transition xmlns:p14="http://schemas.microsoft.com/office/powerpoint/2010/main" spd="slow" advClick="0">
     <p:fade/>
   </p:transition>
 </p:sldLayout>
@@ -2316,7 +2067,7 @@
   <p:clrMapOvr>
     <a:masterClrMapping/>
   </p:clrMapOvr>
-  <p:transition xmlns:p14="http://schemas.microsoft.com/office/powerpoint/2010/main">
+  <p:transition xmlns:p14="http://schemas.microsoft.com/office/powerpoint/2010/main" spd="slow" advClick="0">
     <p:fade/>
   </p:transition>
 </p:sldLayout>
@@ -2576,7 +2327,7 @@
   <p:clrMapOvr>
     <a:masterClrMapping/>
   </p:clrMapOvr>
-  <p:transition xmlns:p14="http://schemas.microsoft.com/office/powerpoint/2010/main">
+  <p:transition xmlns:p14="http://schemas.microsoft.com/office/powerpoint/2010/main" spd="slow" advClick="0">
     <p:fade/>
   </p:transition>
 </p:sldLayout>
@@ -2975,7 +2726,7 @@
   <p:clrMapOvr>
     <a:masterClrMapping/>
   </p:clrMapOvr>
-  <p:transition xmlns:p14="http://schemas.microsoft.com/office/powerpoint/2010/main">
+  <p:transition xmlns:p14="http://schemas.microsoft.com/office/powerpoint/2010/main" spd="slow" advClick="0">
     <p:fade/>
   </p:transition>
 </p:sldLayout>
@@ -3069,7 +2820,7 @@
   <p:clrMapOvr>
     <a:masterClrMapping/>
   </p:clrMapOvr>
-  <p:transition xmlns:p14="http://schemas.microsoft.com/office/powerpoint/2010/main">
+  <p:transition xmlns:p14="http://schemas.microsoft.com/office/powerpoint/2010/main" spd="slow" advClick="0">
     <p:fade/>
   </p:transition>
 </p:sldLayout>
@@ -3136,7 +2887,7 @@
   <p:clrMapOvr>
     <a:masterClrMapping/>
   </p:clrMapOvr>
-  <p:transition xmlns:p14="http://schemas.microsoft.com/office/powerpoint/2010/main">
+  <p:transition xmlns:p14="http://schemas.microsoft.com/office/powerpoint/2010/main" spd="slow" advClick="0">
     <p:fade/>
   </p:transition>
 </p:sldLayout>
@@ -3385,7 +3136,7 @@
   <p:clrMapOvr>
     <a:masterClrMapping/>
   </p:clrMapOvr>
-  <p:transition xmlns:p14="http://schemas.microsoft.com/office/powerpoint/2010/main">
+  <p:transition xmlns:p14="http://schemas.microsoft.com/office/powerpoint/2010/main" spd="slow" advClick="0">
     <p:fade/>
   </p:transition>
 </p:sldLayout>
@@ -3611,7 +3362,7 @@
   <p:clrMapOvr>
     <a:masterClrMapping/>
   </p:clrMapOvr>
-  <p:transition xmlns:p14="http://schemas.microsoft.com/office/powerpoint/2010/main">
+  <p:transition xmlns:p14="http://schemas.microsoft.com/office/powerpoint/2010/main" spd="slow" advClick="0">
     <p:fade/>
   </p:transition>
 </p:sldLayout>
@@ -3753,7 +3504,7 @@
   <p:clrMapOvr>
     <a:masterClrMapping/>
   </p:clrMapOvr>
-  <p:transition xmlns:p14="http://schemas.microsoft.com/office/powerpoint/2010/main">
+  <p:transition xmlns:p14="http://schemas.microsoft.com/office/powerpoint/2010/main" spd="slow" advClick="0">
     <p:fade/>
   </p:transition>
 </p:sldLayout>
@@ -3905,7 +3656,7 @@
   <p:clrMapOvr>
     <a:masterClrMapping/>
   </p:clrMapOvr>
-  <p:transition xmlns:p14="http://schemas.microsoft.com/office/powerpoint/2010/main">
+  <p:transition xmlns:p14="http://schemas.microsoft.com/office/powerpoint/2010/main" spd="slow" advClick="0">
     <p:fade/>
   </p:transition>
 </p:sldLayout>
@@ -4051,7 +3802,7 @@
   <p:clrMapOvr>
     <a:masterClrMapping/>
   </p:clrMapOvr>
-  <p:transition xmlns:p14="http://schemas.microsoft.com/office/powerpoint/2010/main">
+  <p:transition xmlns:p14="http://schemas.microsoft.com/office/powerpoint/2010/main" spd="slow" advClick="0">
     <p:fade/>
   </p:transition>
   <p:timing>
@@ -4226,7 +3977,7 @@
   <p:clrMapOvr>
     <a:masterClrMapping/>
   </p:clrMapOvr>
-  <p:transition xmlns:p14="http://schemas.microsoft.com/office/powerpoint/2010/main">
+  <p:transition xmlns:p14="http://schemas.microsoft.com/office/powerpoint/2010/main" spd="slow" advClick="0">
     <p:fade/>
   </p:transition>
   <p:timing>
@@ -4331,7 +4082,7 @@
   <p:clrMapOvr>
     <a:masterClrMapping/>
   </p:clrMapOvr>
-  <p:transition xmlns:p14="http://schemas.microsoft.com/office/powerpoint/2010/main">
+  <p:transition xmlns:p14="http://schemas.microsoft.com/office/powerpoint/2010/main" spd="slow" advClick="0">
     <p:fade/>
   </p:transition>
 </p:sldLayout>
@@ -4402,7 +4153,7 @@
   <p:clrMapOvr>
     <a:masterClrMapping/>
   </p:clrMapOvr>
-  <p:transition xmlns:p14="http://schemas.microsoft.com/office/powerpoint/2010/main">
+  <p:transition xmlns:p14="http://schemas.microsoft.com/office/powerpoint/2010/main" spd="slow" advClick="0">
     <p:fade/>
   </p:transition>
   <p:timing>
@@ -4639,7 +4390,7 @@
   <p:clrMapOvr>
     <a:masterClrMapping/>
   </p:clrMapOvr>
-  <p:transition xmlns:p14="http://schemas.microsoft.com/office/powerpoint/2010/main">
+  <p:transition xmlns:p14="http://schemas.microsoft.com/office/powerpoint/2010/main" spd="slow" advClick="0">
     <p:fade/>
   </p:transition>
 </p:sldLayout>
@@ -4852,7 +4603,7 @@
   <p:clrMapOvr>
     <a:masterClrMapping/>
   </p:clrMapOvr>
-  <p:transition xmlns:p14="http://schemas.microsoft.com/office/powerpoint/2010/main">
+  <p:transition xmlns:p14="http://schemas.microsoft.com/office/powerpoint/2010/main" spd="slow" advClick="0">
     <p:fade/>
   </p:transition>
 </p:sldLayout>
@@ -5131,7 +4882,7 @@
   <p:clrMapOvr>
     <a:masterClrMapping/>
   </p:clrMapOvr>
-  <p:transition xmlns:p14="http://schemas.microsoft.com/office/powerpoint/2010/main">
+  <p:transition xmlns:p14="http://schemas.microsoft.com/office/powerpoint/2010/main" spd="slow" advClick="0">
     <p:fade/>
   </p:transition>
 </p:sldLayout>
@@ -5291,7 +5042,7 @@
   <p:clrMapOvr>
     <a:masterClrMapping/>
   </p:clrMapOvr>
-  <p:transition xmlns:p14="http://schemas.microsoft.com/office/powerpoint/2010/main">
+  <p:transition xmlns:p14="http://schemas.microsoft.com/office/powerpoint/2010/main" spd="slow" advClick="0">
     <p:fade/>
   </p:transition>
 </p:sldLayout>
@@ -5612,7 +5363,7 @@
     <p:sldLayoutId id="2147483663" r:id="rId7"/>
     <p:sldLayoutId id="2147483664" r:id="rId8"/>
   </p:sldLayoutIdLst>
-  <p:transition xmlns:p14="http://schemas.microsoft.com/office/powerpoint/2010/main">
+  <p:transition xmlns:p14="http://schemas.microsoft.com/office/powerpoint/2010/main" spd="slow" advClick="0">
     <p:fade/>
   </p:transition>
   <p:timing>
@@ -6299,7 +6050,7 @@
     <p:sldLayoutId id="2147483675" r:id="rId10"/>
     <p:sldLayoutId id="2147483676" r:id="rId11"/>
   </p:sldLayoutIdLst>
-  <p:transition xmlns:p14="http://schemas.microsoft.com/office/powerpoint/2010/main">
+  <p:transition xmlns:p14="http://schemas.microsoft.com/office/powerpoint/2010/main" spd="slow" advClick="0">
     <p:fade/>
   </p:transition>
   <p:timing>
@@ -6782,9 +6533,14 @@
   <p:clrMapOvr>
     <a:masterClrMapping/>
   </p:clrMapOvr>
-  <p:transition xmlns:p14="http://schemas.microsoft.com/office/powerpoint/2010/main" advTm="10842">
-    <p:fade/>
-  </p:transition>
+  <mc:AlternateContent xmlns:mc="http://schemas.openxmlformats.org/markup-compatibility/2006" xmlns:p14="http://schemas.microsoft.com/office/powerpoint/2010/main">
+    <mc:Choice Requires="p14">
+      <p:transition p14:dur="0" advClick="0"/>
+    </mc:Choice>
+    <mc:Fallback xmlns="">
+      <p:transition xmlns:p14="http://schemas.microsoft.com/office/powerpoint/2010/main" advClick="0"/>
+    </mc:Fallback>
+  </mc:AlternateContent>
   <p:timing>
     <p:tnLst>
       <p:par>
@@ -6885,7 +6641,7 @@
           <a:p>
             <a:r>
               <a:rPr lang="en-US" sz="5400" dirty="0" smtClean="0"/>
-              <a:t>true is some environment, </a:t>
+              <a:t>true in some environment, </a:t>
             </a:r>
           </a:p>
           <a:p>
@@ -6945,7 +6701,7 @@
   <p:clrMapOvr>
     <a:masterClrMapping/>
   </p:clrMapOvr>
-  <p:transition xmlns:p14="http://schemas.microsoft.com/office/powerpoint/2010/main">
+  <p:transition xmlns:p14="http://schemas.microsoft.com/office/powerpoint/2010/main" spd="slow" advClick="0">
     <p:fade/>
   </p:transition>
   <p:timing>
@@ -7382,8 +7138,13 @@
                   <a:srgbClr val="008000"/>
                 </a:solidFill>
               </a:rPr>
-              <a:t>true,</a:t>
-            </a:r>
+              <a:t>true</a:t>
+            </a:r>
+            <a:endParaRPr lang="en-US" sz="5400" dirty="0" smtClean="0">
+              <a:solidFill>
+                <a:srgbClr val="008000"/>
+              </a:solidFill>
+            </a:endParaRPr>
           </a:p>
           <a:p>
             <a:r>
@@ -7450,7 +7211,7 @@
   <p:clrMapOvr>
     <a:masterClrMapping/>
   </p:clrMapOvr>
-  <p:transition xmlns:p14="http://schemas.microsoft.com/office/powerpoint/2010/main">
+  <p:transition xmlns:p14="http://schemas.microsoft.com/office/powerpoint/2010/main" spd="slow" advClick="0">
     <p:fade/>
   </p:transition>
   <p:timing>
@@ -7489,7 +7250,7 @@
                                         <p:tgtEl>
                                           <p:spTgt spid="3">
                                             <p:txEl>
-                                              <p:pRg st="0" end="0"/>
+                                              <p:pRg st="1" end="1"/>
                                             </p:txEl>
                                           </p:spTgt>
                                         </p:tgtEl>
@@ -7507,67 +7268,6 @@
                                         <p:tgtEl>
                                           <p:spTgt spid="3">
                                             <p:txEl>
-                                              <p:pRg st="0" end="0"/>
-                                            </p:txEl>
-                                          </p:spTgt>
-                                        </p:tgtEl>
-                                      </p:cBhvr>
-                                    </p:animEffect>
-                                  </p:childTnLst>
-                                </p:cTn>
-                              </p:par>
-                            </p:childTnLst>
-                          </p:cTn>
-                        </p:par>
-                      </p:childTnLst>
-                    </p:cTn>
-                  </p:par>
-                  <p:par>
-                    <p:cTn id="8" fill="hold">
-                      <p:stCondLst>
-                        <p:cond delay="indefinite"/>
-                      </p:stCondLst>
-                      <p:childTnLst>
-                        <p:par>
-                          <p:cTn id="9" fill="hold">
-                            <p:stCondLst>
-                              <p:cond delay="0"/>
-                            </p:stCondLst>
-                            <p:childTnLst>
-                              <p:par>
-                                <p:cTn id="10" presetID="9" presetClass="entr" presetSubtype="0" fill="hold" grpId="1" nodeType="clickEffect">
-                                  <p:stCondLst>
-                                    <p:cond delay="0"/>
-                                  </p:stCondLst>
-                                  <p:childTnLst>
-                                    <p:set>
-                                      <p:cBhvr>
-                                        <p:cTn id="11" dur="1" fill="hold">
-                                          <p:stCondLst>
-                                            <p:cond delay="0"/>
-                                          </p:stCondLst>
-                                        </p:cTn>
-                                        <p:tgtEl>
-                                          <p:spTgt spid="3">
-                                            <p:txEl>
-                                              <p:pRg st="1" end="1"/>
-                                            </p:txEl>
-                                          </p:spTgt>
-                                        </p:tgtEl>
-                                        <p:attrNameLst>
-                                          <p:attrName>style.visibility</p:attrName>
-                                        </p:attrNameLst>
-                                      </p:cBhvr>
-                                      <p:to>
-                                        <p:strVal val="visible"/>
-                                      </p:to>
-                                    </p:set>
-                                    <p:animEffect transition="in" filter="dissolve">
-                                      <p:cBhvr>
-                                        <p:cTn id="12" dur="500"/>
-                                        <p:tgtEl>
-                                          <p:spTgt spid="3">
-                                            <p:txEl>
                                               <p:pRg st="1" end="1"/>
                                             </p:txEl>
                                           </p:spTgt>
@@ -7580,30 +7280,21 @@
                             </p:childTnLst>
                           </p:cTn>
                         </p:par>
-                      </p:childTnLst>
-                    </p:cTn>
-                  </p:par>
-                  <p:par>
-                    <p:cTn id="13" fill="hold">
-                      <p:stCondLst>
-                        <p:cond delay="indefinite"/>
-                      </p:stCondLst>
-                      <p:childTnLst>
                         <p:par>
-                          <p:cTn id="14" fill="hold">
+                          <p:cTn id="8" fill="hold">
                             <p:stCondLst>
-                              <p:cond delay="0"/>
+                              <p:cond delay="500"/>
                             </p:stCondLst>
                             <p:childTnLst>
                               <p:par>
-                                <p:cTn id="15" presetID="9" presetClass="entr" presetSubtype="0" fill="hold" grpId="1" nodeType="clickEffect">
+                                <p:cTn id="9" presetID="9" presetClass="entr" presetSubtype="0" fill="hold" grpId="1" nodeType="afterEffect">
                                   <p:stCondLst>
                                     <p:cond delay="0"/>
                                   </p:stCondLst>
                                   <p:childTnLst>
                                     <p:set>
                                       <p:cBhvr>
-                                        <p:cTn id="16" dur="1" fill="hold">
+                                        <p:cTn id="10" dur="1" fill="hold">
                                           <p:stCondLst>
                                             <p:cond delay="0"/>
                                           </p:stCondLst>
@@ -7625,7 +7316,7 @@
                                     </p:set>
                                     <p:animEffect transition="in" filter="dissolve">
                                       <p:cBhvr>
-                                        <p:cTn id="17" dur="500"/>
+                                        <p:cTn id="11" dur="500"/>
                                         <p:tgtEl>
                                           <p:spTgt spid="3">
                                             <p:txEl>
@@ -7645,26 +7336,26 @@
                     </p:cTn>
                   </p:par>
                   <p:par>
-                    <p:cTn id="18" fill="hold">
+                    <p:cTn id="12" fill="hold">
                       <p:stCondLst>
                         <p:cond delay="indefinite"/>
                       </p:stCondLst>
                       <p:childTnLst>
                         <p:par>
-                          <p:cTn id="19" fill="hold">
+                          <p:cTn id="13" fill="hold">
                             <p:stCondLst>
                               <p:cond delay="0"/>
                             </p:stCondLst>
                             <p:childTnLst>
                               <p:par>
-                                <p:cTn id="20" presetID="9" presetClass="entr" presetSubtype="0" fill="hold" grpId="1" nodeType="clickEffect">
+                                <p:cTn id="14" presetID="9" presetClass="entr" presetSubtype="0" fill="hold" grpId="1" nodeType="clickEffect">
                                   <p:stCondLst>
                                     <p:cond delay="0"/>
                                   </p:stCondLst>
                                   <p:childTnLst>
                                     <p:set>
                                       <p:cBhvr>
-                                        <p:cTn id="21" dur="1" fill="hold">
+                                        <p:cTn id="15" dur="1" fill="hold">
                                           <p:stCondLst>
                                             <p:cond delay="0"/>
                                           </p:stCondLst>
@@ -7686,7 +7377,7 @@
                                     </p:set>
                                     <p:animEffect transition="in" filter="dissolve">
                                       <p:cBhvr>
-                                        <p:cTn id="22" dur="500"/>
+                                        <p:cTn id="16" dur="500"/>
                                         <p:tgtEl>
                                           <p:spTgt spid="3">
                                             <p:txEl>
@@ -7706,26 +7397,26 @@
                     </p:cTn>
                   </p:par>
                   <p:par>
-                    <p:cTn id="23" fill="hold">
+                    <p:cTn id="17" fill="hold">
                       <p:stCondLst>
                         <p:cond delay="indefinite"/>
                       </p:stCondLst>
                       <p:childTnLst>
                         <p:par>
-                          <p:cTn id="24" fill="hold">
+                          <p:cTn id="18" fill="hold">
                             <p:stCondLst>
                               <p:cond delay="0"/>
                             </p:stCondLst>
                             <p:childTnLst>
                               <p:par>
-                                <p:cTn id="25" presetID="9" presetClass="entr" presetSubtype="0" fill="hold" grpId="1" nodeType="clickEffect">
+                                <p:cTn id="19" presetID="9" presetClass="entr" presetSubtype="0" fill="hold" grpId="1" nodeType="clickEffect">
                                   <p:stCondLst>
                                     <p:cond delay="0"/>
                                   </p:stCondLst>
                                   <p:childTnLst>
                                     <p:set>
                                       <p:cBhvr>
-                                        <p:cTn id="26" dur="1" fill="hold">
+                                        <p:cTn id="20" dur="1" fill="hold">
                                           <p:stCondLst>
                                             <p:cond delay="0"/>
                                           </p:stCondLst>
@@ -7747,7 +7438,7 @@
                                     </p:set>
                                     <p:animEffect transition="in" filter="dissolve">
                                       <p:cBhvr>
-                                        <p:cTn id="27" dur="500"/>
+                                        <p:cTn id="21" dur="500"/>
                                         <p:tgtEl>
                                           <p:spTgt spid="3">
                                             <p:txEl>
@@ -7813,7 +7504,7 @@
       </p:grpSpPr>
       <p:sp>
         <p:nvSpPr>
-          <p:cNvPr id="2" name="Title 1"/>
+          <p:cNvPr id="13" name="Title 12"/>
           <p:cNvSpPr>
             <a:spLocks noGrp="1"/>
           </p:cNvSpPr>
@@ -7823,8 +7514,8 @@
         </p:nvSpPr>
         <p:spPr>
           <a:xfrm>
-            <a:off x="1457070" y="304800"/>
-            <a:ext cx="7543800" cy="1143000"/>
+            <a:off x="2260600" y="304800"/>
+            <a:ext cx="6121400" cy="1193800"/>
           </a:xfrm>
         </p:spPr>
         <p:txBody>
@@ -7832,1297 +7523,23 @@
           <a:lstStyle/>
           <a:p>
             <a:r>
-              <a:rPr lang="en-US" sz="4000" dirty="0" smtClean="0"/>
-              <a:t>Other Applications</a:t>
-            </a:r>
-            <a:endParaRPr lang="en-US" sz="4000" dirty="0"/>
+              <a:rPr lang="en-US" sz="4600" dirty="0" smtClean="0"/>
+              <a:t>Soundness &amp; Validity</a:t>
+            </a:r>
+            <a:endParaRPr lang="en-US" sz="4600" dirty="0"/>
           </a:p>
         </p:txBody>
       </p:sp>
       <p:sp>
         <p:nvSpPr>
-          <p:cNvPr id="7" name="TextBox 6"/>
+          <p:cNvPr id="14" name="TextBox 13"/>
           <p:cNvSpPr txBox="1"/>
           <p:nvPr/>
         </p:nvSpPr>
         <p:spPr>
           <a:xfrm>
-            <a:off x="178039" y="3858422"/>
-            <a:ext cx="8781571" cy="1508105"/>
-          </a:xfrm>
-          <a:prstGeom prst="rect">
-            <a:avLst/>
-          </a:prstGeom>
-          <a:noFill/>
-        </p:spPr>
-        <p:txBody>
-          <a:bodyPr wrap="none" rtlCol="0">
-            <a:spAutoFit/>
-          </a:bodyPr>
-          <a:lstStyle/>
-          <a:p>
-            <a:r>
-              <a:rPr lang="en-US" sz="3600" b="1" dirty="0" smtClean="0">
-                <a:latin typeface="Courier New" pitchFamily="49" charset="0"/>
-                <a:cs typeface="Courier New" pitchFamily="49" charset="0"/>
-              </a:rPr>
-              <a:t>if ((x&gt;0) || (x </a:t>
-            </a:r>
-            <a:r>
-              <a:rPr lang="en-US" sz="3600" b="1" dirty="0" smtClean="0">
-                <a:latin typeface="Courier New" pitchFamily="49" charset="0"/>
-                <a:cs typeface="Courier New" pitchFamily="49" charset="0"/>
-                <a:sym typeface="Euclid Symbol"/>
-              </a:rPr>
-              <a:t>&lt;= </a:t>
-            </a:r>
-            <a:r>
-              <a:rPr lang="en-US" sz="3600" b="1" dirty="0" smtClean="0">
-                <a:latin typeface="Courier New" pitchFamily="49" charset="0"/>
-                <a:cs typeface="Courier New" pitchFamily="49" charset="0"/>
-              </a:rPr>
-              <a:t>0 &amp;&amp; y&gt;100))</a:t>
-            </a:r>
-          </a:p>
-          <a:p>
-            <a:pPr algn="ctr"/>
-            <a:r>
-              <a:rPr lang="en-US" sz="2800" b="1" dirty="0" smtClean="0">
-                <a:latin typeface="Comic Sans MS" pitchFamily="66" charset="0"/>
-                <a:sym typeface="Euclid Extra"/>
-              </a:rPr>
-              <a:t></a:t>
-            </a:r>
-          </a:p>
-          <a:p>
-            <a:pPr algn="ctr"/>
-            <a:r>
-              <a:rPr lang="en-US" sz="2800" b="1" dirty="0" smtClean="0">
-                <a:latin typeface="Comic Sans MS" pitchFamily="66" charset="0"/>
-                <a:sym typeface="Euclid Extra"/>
-              </a:rPr>
-              <a:t>(more code)</a:t>
-            </a:r>
-            <a:endParaRPr lang="en-US" sz="2800" b="1" dirty="0">
-              <a:latin typeface="Comic Sans MS" pitchFamily="66" charset="0"/>
-            </a:endParaRPr>
-          </a:p>
-        </p:txBody>
-      </p:sp>
-      <p:sp>
-        <p:nvSpPr>
-          <p:cNvPr id="6" name="Slide Number Placeholder 2"/>
-          <p:cNvSpPr>
-            <a:spLocks noGrp="1"/>
-          </p:cNvSpPr>
-          <p:nvPr>
-            <p:ph type="sldNum" sz="quarter" idx="10"/>
-          </p:nvPr>
-        </p:nvSpPr>
-        <p:spPr>
-          <a:xfrm>
-            <a:off x="8061478" y="6553200"/>
-            <a:ext cx="1082523" cy="276999"/>
-          </a:xfrm>
-        </p:spPr>
-        <p:txBody>
-          <a:bodyPr/>
-          <a:lstStyle/>
-          <a:p>
-            <a:r>
-              <a:rPr lang="en-US" dirty="0" smtClean="0"/>
-              <a:t>IMPLIES.</a:t>
-            </a:r>
-            <a:fld id="{3251DA95-B240-47FE-901D-B78FC8E8E532}" type="slidenum">
-              <a:rPr lang="en-US" smtClean="0"/>
-              <a:pPr/>
-              <a:t>12</a:t>
-            </a:fld>
-            <a:endParaRPr lang="en-US" dirty="0"/>
-          </a:p>
-        </p:txBody>
-      </p:sp>
-      <p:sp>
-        <p:nvSpPr>
-          <p:cNvPr id="5" name="TextBox 4"/>
-          <p:cNvSpPr txBox="1"/>
-          <p:nvPr/>
-        </p:nvSpPr>
-        <p:spPr>
-          <a:xfrm>
-            <a:off x="2898829" y="3183430"/>
-            <a:ext cx="915635" cy="707886"/>
-          </a:xfrm>
-          <a:prstGeom prst="rect">
-            <a:avLst/>
-          </a:prstGeom>
-          <a:noFill/>
-        </p:spPr>
-        <p:txBody>
-          <a:bodyPr wrap="none" rtlCol="0">
-            <a:spAutoFit/>
-          </a:bodyPr>
-          <a:lstStyle/>
-          <a:p>
-            <a:r>
-              <a:rPr lang="en-US" sz="4000" dirty="0" smtClean="0">
-                <a:solidFill>
-                  <a:schemeClr val="accent1">
-                    <a:lumMod val="50000"/>
-                  </a:schemeClr>
-                </a:solidFill>
-                <a:latin typeface="Comic Sans MS" pitchFamily="66" charset="0"/>
-              </a:rPr>
-              <a:t>OR</a:t>
-            </a:r>
-            <a:endParaRPr lang="en-US" sz="4000" dirty="0">
-              <a:solidFill>
-                <a:schemeClr val="accent1">
-                  <a:lumMod val="50000"/>
-                </a:schemeClr>
-              </a:solidFill>
-              <a:latin typeface="Comic Sans MS" pitchFamily="66" charset="0"/>
-            </a:endParaRPr>
-          </a:p>
-        </p:txBody>
-      </p:sp>
-      <p:sp>
-        <p:nvSpPr>
-          <p:cNvPr id="8" name="TextBox 7"/>
-          <p:cNvSpPr txBox="1"/>
-          <p:nvPr/>
-        </p:nvSpPr>
-        <p:spPr>
-          <a:xfrm>
-            <a:off x="5636836" y="3206324"/>
-            <a:ext cx="1338829" cy="707886"/>
-          </a:xfrm>
-          <a:prstGeom prst="rect">
-            <a:avLst/>
-          </a:prstGeom>
-          <a:noFill/>
-        </p:spPr>
-        <p:txBody>
-          <a:bodyPr wrap="none" rtlCol="0">
-            <a:spAutoFit/>
-          </a:bodyPr>
-          <a:lstStyle/>
-          <a:p>
-            <a:r>
-              <a:rPr lang="en-US" sz="4000" dirty="0" smtClean="0">
-                <a:solidFill>
-                  <a:schemeClr val="accent1">
-                    <a:lumMod val="50000"/>
-                  </a:schemeClr>
-                </a:solidFill>
-                <a:latin typeface="Comic Sans MS" pitchFamily="66" charset="0"/>
-              </a:rPr>
-              <a:t>AND</a:t>
-            </a:r>
-            <a:endParaRPr lang="en-US" sz="4000" dirty="0">
-              <a:solidFill>
-                <a:schemeClr val="accent1">
-                  <a:lumMod val="50000"/>
-                </a:schemeClr>
-              </a:solidFill>
-              <a:latin typeface="Comic Sans MS" pitchFamily="66" charset="0"/>
-            </a:endParaRPr>
-          </a:p>
-        </p:txBody>
-      </p:sp>
-      <p:sp>
-        <p:nvSpPr>
-          <p:cNvPr id="9" name="TextBox 8"/>
-          <p:cNvSpPr txBox="1"/>
-          <p:nvPr/>
-        </p:nvSpPr>
-        <p:spPr>
-          <a:xfrm>
-            <a:off x="931820" y="1594561"/>
-            <a:ext cx="7464303" cy="830997"/>
-          </a:xfrm>
-          <a:prstGeom prst="rect">
-            <a:avLst/>
-          </a:prstGeom>
-          <a:noFill/>
-        </p:spPr>
-        <p:txBody>
-          <a:bodyPr wrap="none" rtlCol="0">
-            <a:spAutoFit/>
-          </a:bodyPr>
-          <a:lstStyle/>
-          <a:p>
-            <a:pPr algn="l"/>
-            <a:r>
-              <a:rPr lang="en-US" sz="4800" dirty="0" smtClean="0">
-                <a:latin typeface="Comic Sans MS"/>
-                <a:cs typeface="Comic Sans MS"/>
-              </a:rPr>
-              <a:t>Java Logical Expressions:</a:t>
-            </a:r>
-          </a:p>
-        </p:txBody>
-      </p:sp>
-    </p:spTree>
-  </p:cSld>
-  <p:clrMapOvr>
-    <a:masterClrMapping/>
-  </p:clrMapOvr>
-  <mc:AlternateContent xmlns:mc="http://schemas.openxmlformats.org/markup-compatibility/2006" xmlns:p14="http://schemas.microsoft.com/office/powerpoint/2010/main">
-    <mc:Choice Requires="p14">
-      <p:transition spd="slow" p14:dur="1100">
-        <p:fade thruBlk="1"/>
-      </p:transition>
-    </mc:Choice>
-    <mc:Fallback xmlns="">
-      <p:transition xmlns:p14="http://schemas.microsoft.com/office/powerpoint/2010/main" spd="slow">
-        <p:fade thruBlk="1"/>
-      </p:transition>
-    </mc:Fallback>
-  </mc:AlternateContent>
-  <p:timing>
-    <p:tnLst>
-      <p:par>
-        <p:cTn xmlns:p14="http://schemas.microsoft.com/office/powerpoint/2010/main" id="1" dur="indefinite" restart="never" nodeType="tmRoot"/>
-      </p:par>
-    </p:tnLst>
-  </p:timing>
-</p:sld>
-</file>
-
-<file path=ppt/slides/slide13.xml><?xml version="1.0" encoding="utf-8"?>
-<p:sld xmlns:a="http://schemas.openxmlformats.org/drawingml/2006/main" xmlns:r="http://schemas.openxmlformats.org/officeDocument/2006/relationships" xmlns:p="http://schemas.openxmlformats.org/presentationml/2006/main" show="0">
-  <p:cSld>
-    <p:spTree>
-      <p:nvGrpSpPr>
-        <p:cNvPr id="1" name=""/>
-        <p:cNvGrpSpPr/>
-        <p:nvPr/>
-      </p:nvGrpSpPr>
-      <p:grpSpPr>
-        <a:xfrm>
-          <a:off x="0" y="0"/>
-          <a:ext cx="0" cy="0"/>
-          <a:chOff x="0" y="0"/>
-          <a:chExt cx="0" cy="0"/>
-        </a:xfrm>
-      </p:grpSpPr>
-      <p:sp>
-        <p:nvSpPr>
-          <p:cNvPr id="6" name="Slide Number Placeholder 2"/>
-          <p:cNvSpPr>
-            <a:spLocks noGrp="1"/>
-          </p:cNvSpPr>
-          <p:nvPr>
-            <p:ph type="sldNum" sz="quarter" idx="10"/>
-          </p:nvPr>
-        </p:nvSpPr>
-        <p:spPr>
-          <a:xfrm>
-            <a:off x="8061478" y="6553200"/>
-            <a:ext cx="1082523" cy="276999"/>
-          </a:xfrm>
-          <a:noFill/>
-        </p:spPr>
-        <p:txBody>
-          <a:bodyPr/>
-          <a:lstStyle/>
-          <a:p>
-            <a:r>
-              <a:rPr lang="en-US" dirty="0" smtClean="0"/>
-              <a:t>IMPLIES.</a:t>
-            </a:r>
-            <a:fld id="{0150943C-9303-41DF-A6FA-7E32D6C5D18E}" type="slidenum">
-              <a:rPr lang="en-US" smtClean="0"/>
-              <a:pPr/>
-              <a:t>13</a:t>
-            </a:fld>
-            <a:endParaRPr lang="en-US" dirty="0" smtClean="0"/>
-          </a:p>
-        </p:txBody>
-      </p:sp>
-      <p:sp>
-        <p:nvSpPr>
-          <p:cNvPr id="7" name="Title 1"/>
-          <p:cNvSpPr>
-            <a:spLocks noGrp="1"/>
-          </p:cNvSpPr>
-          <p:nvPr>
-            <p:ph type="title"/>
-          </p:nvPr>
-        </p:nvSpPr>
-        <p:spPr>
-          <a:xfrm>
-            <a:off x="2401623" y="276412"/>
-            <a:ext cx="4354015" cy="951886"/>
-          </a:xfrm>
-        </p:spPr>
-        <p:txBody>
-          <a:bodyPr/>
-          <a:lstStyle/>
-          <a:p>
-            <a:r>
-              <a:rPr lang="en-US" sz="4000" dirty="0" smtClean="0"/>
-              <a:t>Digital Logic</a:t>
-            </a:r>
-            <a:endParaRPr lang="en-US" sz="4000" dirty="0"/>
-          </a:p>
-        </p:txBody>
-      </p:sp>
-      <p:graphicFrame>
-        <p:nvGraphicFramePr>
-          <p:cNvPr id="8" name="Object 7"/>
-          <p:cNvGraphicFramePr>
-            <a:graphicFrameLocks noChangeAspect="1"/>
-          </p:cNvGraphicFramePr>
-          <p:nvPr>
-            <p:extLst>
-              <p:ext uri="{D42A27DB-BD31-4B8C-83A1-F6EECF244321}">
-                <p14:modId xmlns:p14="http://schemas.microsoft.com/office/powerpoint/2010/main" val="1837302888"/>
-              </p:ext>
-            </p:extLst>
-          </p:nvPr>
-        </p:nvGraphicFramePr>
-        <p:xfrm>
-          <a:off x="3494088" y="1304925"/>
-          <a:ext cx="3286125" cy="4240213"/>
-        </p:xfrm>
-        <a:graphic>
-          <a:graphicData uri="http://schemas.openxmlformats.org/presentationml/2006/ole">
-            <mc:AlternateContent xmlns:mc="http://schemas.openxmlformats.org/markup-compatibility/2006">
-              <mc:Choice xmlns:v="urn:schemas-microsoft-com:vml" Requires="v">
-                <p:oleObj spid="_x0000_s339006" name="Equation" r:id="rId4" imgW="876300" imgH="1130300" progId="Equation.DSMT4">
-                  <p:embed/>
-                </p:oleObj>
-              </mc:Choice>
-              <mc:Fallback>
-                <p:oleObj name="Equation" r:id="rId4" imgW="876300" imgH="1130300" progId="Equation.DSMT4">
-                  <p:embed/>
-                  <p:pic>
-                    <p:nvPicPr>
-                      <p:cNvPr id="0" name="Picture 2"/>
-                      <p:cNvPicPr>
-                        <a:picLocks noChangeAspect="1" noChangeArrowheads="1"/>
-                      </p:cNvPicPr>
-                      <p:nvPr/>
-                    </p:nvPicPr>
-                    <p:blipFill>
-                      <a:blip r:embed="rId5"/>
-                      <a:srcRect/>
-                      <a:stretch>
-                        <a:fillRect/>
-                      </a:stretch>
-                    </p:blipFill>
-                    <p:spPr bwMode="auto">
-                      <a:xfrm>
-                        <a:off x="3494088" y="1304925"/>
-                        <a:ext cx="3286125" cy="4240213"/>
-                      </a:xfrm>
-                      <a:prstGeom prst="rect">
-                        <a:avLst/>
-                      </a:prstGeom>
-                      <a:noFill/>
-                      <a:extLst>
-                        <a:ext uri="{909E8E84-426E-40dd-AFC4-6F175D3DCCD1}">
-                          <a14:hiddenFill xmlns:a14="http://schemas.microsoft.com/office/drawing/2010/main">
-                            <a:solidFill>
-                              <a:srgbClr val="FFFFFF"/>
-                            </a:solidFill>
-                          </a14:hiddenFill>
-                        </a:ext>
-                      </a:extLst>
-                    </p:spPr>
-                  </p:pic>
-                </p:oleObj>
-              </mc:Fallback>
-            </mc:AlternateContent>
-          </a:graphicData>
-        </a:graphic>
-      </p:graphicFrame>
-    </p:spTree>
-  </p:cSld>
-  <p:clrMapOvr>
-    <a:masterClrMapping/>
-  </p:clrMapOvr>
-  <p:transition xmlns:p14="http://schemas.microsoft.com/office/powerpoint/2010/main">
-    <p:fade/>
-  </p:transition>
-  <p:timing>
-    <p:tnLst>
-      <p:par>
-        <p:cTn xmlns:p14="http://schemas.microsoft.com/office/powerpoint/2010/main" id="1" dur="indefinite" restart="never" nodeType="tmRoot"/>
-      </p:par>
-    </p:tnLst>
-  </p:timing>
-</p:sld>
-</file>
-
-<file path=ppt/slides/slide14.xml><?xml version="1.0" encoding="utf-8"?>
-<p:sld xmlns:a="http://schemas.openxmlformats.org/drawingml/2006/main" xmlns:r="http://schemas.openxmlformats.org/officeDocument/2006/relationships" xmlns:p="http://schemas.openxmlformats.org/presentationml/2006/main">
-  <p:cSld>
-    <p:spTree>
-      <p:nvGrpSpPr>
-        <p:cNvPr id="1" name=""/>
-        <p:cNvGrpSpPr/>
-        <p:nvPr/>
-      </p:nvGrpSpPr>
-      <p:grpSpPr>
-        <a:xfrm>
-          <a:off x="0" y="0"/>
-          <a:ext cx="0" cy="0"/>
-          <a:chOff x="0" y="0"/>
-          <a:chExt cx="0" cy="0"/>
-        </a:xfrm>
-      </p:grpSpPr>
-      <p:pic>
-        <p:nvPicPr>
-          <p:cNvPr id="287748" name="Picture 4"/>
-          <p:cNvPicPr>
-            <a:picLocks noChangeAspect="1" noChangeArrowheads="1"/>
-          </p:cNvPicPr>
-          <p:nvPr/>
-        </p:nvPicPr>
-        <p:blipFill>
-          <a:blip r:embed="rId4"/>
-          <a:srcRect/>
-          <a:stretch>
-            <a:fillRect/>
-          </a:stretch>
-        </p:blipFill>
-        <p:spPr bwMode="auto">
-          <a:xfrm>
-            <a:off x="3024187" y="3436938"/>
-            <a:ext cx="3095625" cy="2000250"/>
-          </a:xfrm>
-          <a:prstGeom prst="rect">
-            <a:avLst/>
-          </a:prstGeom>
-          <a:noFill/>
-          <a:ln w="9525">
-            <a:noFill/>
-            <a:miter lim="800000"/>
-            <a:headEnd/>
-            <a:tailEnd/>
-          </a:ln>
-          <a:effectLst/>
-        </p:spPr>
-      </p:pic>
-      <p:sp>
-        <p:nvSpPr>
-          <p:cNvPr id="15" name="Rectangle 14"/>
-          <p:cNvSpPr/>
-          <p:nvPr/>
-        </p:nvSpPr>
-        <p:spPr>
-          <a:xfrm>
-            <a:off x="3630706" y="3436938"/>
-            <a:ext cx="1963270" cy="2143591"/>
-          </a:xfrm>
-          <a:prstGeom prst="rect">
-            <a:avLst/>
-          </a:prstGeom>
-          <a:noFill/>
-          <a:ln>
-            <a:solidFill>
-              <a:schemeClr val="tx2"/>
-            </a:solidFill>
-            <a:prstDash val="sysDash"/>
-          </a:ln>
-        </p:spPr>
-        <p:style>
-          <a:lnRef idx="2">
-            <a:schemeClr val="accent1">
-              <a:shade val="50000"/>
-            </a:schemeClr>
-          </a:lnRef>
-          <a:fillRef idx="1">
-            <a:schemeClr val="accent1"/>
-          </a:fillRef>
-          <a:effectRef idx="0">
-            <a:schemeClr val="accent1"/>
-          </a:effectRef>
-          <a:fontRef idx="minor">
-            <a:schemeClr val="lt1"/>
-          </a:fontRef>
-        </p:style>
-        <p:txBody>
-          <a:bodyPr rtlCol="0" anchor="ctr"/>
-          <a:lstStyle/>
-          <a:p>
-            <a:pPr algn="ctr"/>
-            <a:endParaRPr lang="en-US"/>
-          </a:p>
-        </p:txBody>
-      </p:sp>
-      <p:sp>
-        <p:nvSpPr>
-          <p:cNvPr id="16" name="TextBox 15"/>
-          <p:cNvSpPr txBox="1"/>
-          <p:nvPr/>
-        </p:nvSpPr>
-        <p:spPr>
-          <a:xfrm>
-            <a:off x="3477790" y="5782235"/>
-            <a:ext cx="2188420" cy="584775"/>
-          </a:xfrm>
-          <a:prstGeom prst="rect">
-            <a:avLst/>
-          </a:prstGeom>
-          <a:noFill/>
-        </p:spPr>
-        <p:txBody>
-          <a:bodyPr wrap="none" rtlCol="0">
-            <a:spAutoFit/>
-          </a:bodyPr>
-          <a:lstStyle/>
-          <a:p>
-            <a:r>
-              <a:rPr lang="en-US" sz="3200" dirty="0" smtClean="0">
-                <a:latin typeface="Comic Sans MS" pitchFamily="66" charset="0"/>
-              </a:rPr>
-              <a:t>half adder</a:t>
-            </a:r>
-            <a:endParaRPr lang="en-US" sz="3200" dirty="0">
-              <a:latin typeface="Comic Sans MS" pitchFamily="66" charset="0"/>
-            </a:endParaRPr>
-          </a:p>
-        </p:txBody>
-      </p:sp>
-      <p:sp>
-        <p:nvSpPr>
-          <p:cNvPr id="17" name="TextBox 16"/>
-          <p:cNvSpPr txBox="1"/>
-          <p:nvPr/>
-        </p:nvSpPr>
-        <p:spPr>
-          <a:xfrm>
-            <a:off x="4572000" y="6306671"/>
-            <a:ext cx="4216219" cy="276999"/>
-          </a:xfrm>
-          <a:prstGeom prst="rect">
-            <a:avLst/>
-          </a:prstGeom>
-          <a:noFill/>
-        </p:spPr>
-        <p:txBody>
-          <a:bodyPr wrap="none" rtlCol="0">
-            <a:spAutoFit/>
-          </a:bodyPr>
-          <a:lstStyle/>
-          <a:p>
-            <a:r>
-              <a:rPr lang="en-US" sz="1200" dirty="0" smtClean="0"/>
-              <a:t>from </a:t>
-            </a:r>
-            <a:r>
-              <a:rPr lang="en-US" sz="1000" dirty="0" smtClean="0">
-                <a:latin typeface="Courier New" pitchFamily="49" charset="0"/>
-                <a:cs typeface="Courier New" pitchFamily="49" charset="0"/>
-              </a:rPr>
-              <a:t>http://en.wikipedia.org/wiki/Adder_(electronics)</a:t>
-            </a:r>
-            <a:endParaRPr lang="en-US" sz="1000" dirty="0">
-              <a:latin typeface="Courier New" pitchFamily="49" charset="0"/>
-              <a:cs typeface="Courier New" pitchFamily="49" charset="0"/>
-            </a:endParaRPr>
-          </a:p>
-        </p:txBody>
-      </p:sp>
-      <p:sp>
-        <p:nvSpPr>
-          <p:cNvPr id="10" name="Slide Number Placeholder 2"/>
-          <p:cNvSpPr>
-            <a:spLocks noGrp="1"/>
-          </p:cNvSpPr>
-          <p:nvPr>
-            <p:ph type="sldNum" sz="quarter" idx="10"/>
-          </p:nvPr>
-        </p:nvSpPr>
-        <p:spPr>
-          <a:xfrm>
-            <a:off x="8061478" y="6553200"/>
-            <a:ext cx="1082523" cy="276999"/>
-          </a:xfrm>
-          <a:noFill/>
-        </p:spPr>
-        <p:txBody>
-          <a:bodyPr/>
-          <a:lstStyle/>
-          <a:p>
-            <a:r>
-              <a:rPr lang="en-US" dirty="0" smtClean="0"/>
-              <a:t>IMPLIES.</a:t>
-            </a:r>
-            <a:fld id="{0150943C-9303-41DF-A6FA-7E32D6C5D18E}" type="slidenum">
-              <a:rPr lang="en-US" smtClean="0"/>
-              <a:pPr/>
-              <a:t>14</a:t>
-            </a:fld>
-            <a:endParaRPr lang="en-US" dirty="0" smtClean="0"/>
-          </a:p>
-        </p:txBody>
-      </p:sp>
-      <p:sp>
-        <p:nvSpPr>
-          <p:cNvPr id="13" name="Title 1"/>
-          <p:cNvSpPr>
-            <a:spLocks noGrp="1"/>
-          </p:cNvSpPr>
-          <p:nvPr>
-            <p:ph type="title"/>
-          </p:nvPr>
-        </p:nvSpPr>
-        <p:spPr>
-          <a:xfrm>
-            <a:off x="1678539" y="239328"/>
-            <a:ext cx="6785252" cy="1021487"/>
-          </a:xfrm>
-        </p:spPr>
-        <p:txBody>
-          <a:bodyPr/>
-          <a:lstStyle/>
-          <a:p>
-            <a:r>
-              <a:rPr lang="en-US" sz="4000" dirty="0" smtClean="0"/>
-              <a:t>Application:  Digital Logic</a:t>
-            </a:r>
-            <a:endParaRPr lang="en-US" sz="4000" dirty="0"/>
-          </a:p>
-        </p:txBody>
-      </p:sp>
-      <p:graphicFrame>
-        <p:nvGraphicFramePr>
-          <p:cNvPr id="9" name="Object 8"/>
-          <p:cNvGraphicFramePr>
-            <a:graphicFrameLocks noChangeAspect="1"/>
-          </p:cNvGraphicFramePr>
-          <p:nvPr>
-            <p:extLst>
-              <p:ext uri="{D42A27DB-BD31-4B8C-83A1-F6EECF244321}">
-                <p14:modId xmlns:p14="http://schemas.microsoft.com/office/powerpoint/2010/main" val="857794340"/>
-              </p:ext>
-            </p:extLst>
-          </p:nvPr>
-        </p:nvGraphicFramePr>
-        <p:xfrm>
-          <a:off x="2447925" y="1244600"/>
-          <a:ext cx="4300538" cy="1860550"/>
-        </p:xfrm>
-        <a:graphic>
-          <a:graphicData uri="http://schemas.openxmlformats.org/presentationml/2006/ole">
-            <mc:AlternateContent xmlns:mc="http://schemas.openxmlformats.org/markup-compatibility/2006">
-              <mc:Choice xmlns:v="urn:schemas-microsoft-com:vml" Requires="v">
-                <p:oleObj spid="_x0000_s400447" name="Equation" r:id="rId5" imgW="2349500" imgH="1016000" progId="Equation.DSMT4">
-                  <p:embed/>
-                </p:oleObj>
-              </mc:Choice>
-              <mc:Fallback>
-                <p:oleObj name="Equation" r:id="rId5" imgW="2349500" imgH="1016000" progId="Equation.DSMT4">
-                  <p:embed/>
-                  <p:pic>
-                    <p:nvPicPr>
-                      <p:cNvPr id="0" name="Picture 2"/>
-                      <p:cNvPicPr>
-                        <a:picLocks noChangeAspect="1" noChangeArrowheads="1"/>
-                      </p:cNvPicPr>
-                      <p:nvPr/>
-                    </p:nvPicPr>
-                    <p:blipFill>
-                      <a:blip r:embed="rId6"/>
-                      <a:srcRect/>
-                      <a:stretch>
-                        <a:fillRect/>
-                      </a:stretch>
-                    </p:blipFill>
-                    <p:spPr bwMode="auto">
-                      <a:xfrm>
-                        <a:off x="2447925" y="1244600"/>
-                        <a:ext cx="4300538" cy="1860550"/>
-                      </a:xfrm>
-                      <a:prstGeom prst="rect">
-                        <a:avLst/>
-                      </a:prstGeom>
-                      <a:noFill/>
-                      <a:extLst>
-                        <a:ext uri="{909E8E84-426E-40dd-AFC4-6F175D3DCCD1}">
-                          <a14:hiddenFill xmlns:a14="http://schemas.microsoft.com/office/drawing/2010/main">
-                            <a:solidFill>
-                              <a:srgbClr val="FFFFFF"/>
-                            </a:solidFill>
-                          </a14:hiddenFill>
-                        </a:ext>
-                      </a:extLst>
-                    </p:spPr>
-                  </p:pic>
-                </p:oleObj>
-              </mc:Fallback>
-            </mc:AlternateContent>
-          </a:graphicData>
-        </a:graphic>
-      </p:graphicFrame>
-    </p:spTree>
-  </p:cSld>
-  <p:clrMapOvr>
-    <a:masterClrMapping/>
-  </p:clrMapOvr>
-  <p:transition xmlns:p14="http://schemas.microsoft.com/office/powerpoint/2010/main">
-    <p:fade/>
-  </p:transition>
-  <p:timing>
-    <p:tnLst>
-      <p:par>
-        <p:cTn xmlns:p14="http://schemas.microsoft.com/office/powerpoint/2010/main" id="1" dur="indefinite" restart="never" nodeType="tmRoot"/>
-      </p:par>
-    </p:tnLst>
-  </p:timing>
-</p:sld>
-</file>
-
-<file path=ppt/slides/slide15.xml><?xml version="1.0" encoding="utf-8"?>
-<p:sld xmlns:a="http://schemas.openxmlformats.org/drawingml/2006/main" xmlns:r="http://schemas.openxmlformats.org/officeDocument/2006/relationships" xmlns:p="http://schemas.openxmlformats.org/presentationml/2006/main">
-  <p:cSld>
-    <p:spTree>
-      <p:nvGrpSpPr>
-        <p:cNvPr id="1" name=""/>
-        <p:cNvGrpSpPr/>
-        <p:nvPr/>
-      </p:nvGrpSpPr>
-      <p:grpSpPr>
-        <a:xfrm>
-          <a:off x="0" y="0"/>
-          <a:ext cx="0" cy="0"/>
-          <a:chOff x="0" y="0"/>
-          <a:chExt cx="0" cy="0"/>
-        </a:xfrm>
-      </p:grpSpPr>
-      <p:sp>
-        <p:nvSpPr>
-          <p:cNvPr id="8" name="Rectangle 7"/>
-          <p:cNvSpPr/>
-          <p:nvPr/>
-        </p:nvSpPr>
-        <p:spPr>
-          <a:xfrm>
-            <a:off x="4572000" y="3514170"/>
-            <a:ext cx="1317812" cy="1344705"/>
-          </a:xfrm>
-          <a:prstGeom prst="rect">
-            <a:avLst/>
-          </a:prstGeom>
-          <a:noFill/>
-          <a:ln>
-            <a:solidFill>
-              <a:schemeClr val="tx2"/>
-            </a:solidFill>
-            <a:prstDash val="sysDash"/>
-          </a:ln>
-        </p:spPr>
-        <p:style>
-          <a:lnRef idx="2">
-            <a:schemeClr val="accent1">
-              <a:shade val="50000"/>
-            </a:schemeClr>
-          </a:lnRef>
-          <a:fillRef idx="1">
-            <a:schemeClr val="accent1"/>
-          </a:fillRef>
-          <a:effectRef idx="0">
-            <a:schemeClr val="accent1"/>
-          </a:effectRef>
-          <a:fontRef idx="minor">
-            <a:schemeClr val="lt1"/>
-          </a:fontRef>
-        </p:style>
-        <p:txBody>
-          <a:bodyPr rtlCol="0" anchor="ctr"/>
-          <a:lstStyle/>
-          <a:p>
-            <a:pPr algn="ctr"/>
-            <a:endParaRPr lang="en-US" sz="2800"/>
-          </a:p>
-        </p:txBody>
-      </p:sp>
-      <p:grpSp>
-        <p:nvGrpSpPr>
-          <p:cNvPr id="2" name="Group 50"/>
-          <p:cNvGrpSpPr/>
-          <p:nvPr/>
-        </p:nvGrpSpPr>
-        <p:grpSpPr>
-          <a:xfrm>
-            <a:off x="914399" y="4007228"/>
-            <a:ext cx="2299448" cy="1358152"/>
-            <a:chOff x="914399" y="3872758"/>
-            <a:chExt cx="2299448" cy="1358152"/>
-          </a:xfrm>
-        </p:grpSpPr>
-        <p:sp>
-          <p:nvSpPr>
-            <p:cNvPr id="15" name="Rectangle 14"/>
-            <p:cNvSpPr/>
-            <p:nvPr/>
-          </p:nvSpPr>
-          <p:spPr>
-            <a:xfrm>
-              <a:off x="1896035" y="3886205"/>
-              <a:ext cx="1317812" cy="1344705"/>
-            </a:xfrm>
-            <a:prstGeom prst="rect">
-              <a:avLst/>
-            </a:prstGeom>
-            <a:noFill/>
-            <a:ln>
-              <a:solidFill>
-                <a:schemeClr val="tx2"/>
-              </a:solidFill>
-              <a:prstDash val="sysDash"/>
-            </a:ln>
-          </p:spPr>
-          <p:style>
-            <a:lnRef idx="2">
-              <a:schemeClr val="accent1">
-                <a:shade val="50000"/>
-              </a:schemeClr>
-            </a:lnRef>
-            <a:fillRef idx="1">
-              <a:schemeClr val="accent1"/>
-            </a:fillRef>
-            <a:effectRef idx="0">
-              <a:schemeClr val="accent1"/>
-            </a:effectRef>
-            <a:fontRef idx="minor">
-              <a:schemeClr val="lt1"/>
-            </a:fontRef>
-          </p:style>
-          <p:txBody>
-            <a:bodyPr rtlCol="0" anchor="ctr"/>
-            <a:lstStyle/>
-            <a:p>
-              <a:pPr algn="ctr"/>
-              <a:endParaRPr lang="en-US" sz="2800"/>
-            </a:p>
-          </p:txBody>
-        </p:sp>
-        <p:grpSp>
-          <p:nvGrpSpPr>
-            <p:cNvPr id="3" name="Group 17"/>
-            <p:cNvGrpSpPr/>
-            <p:nvPr/>
-          </p:nvGrpSpPr>
-          <p:grpSpPr>
-            <a:xfrm>
-              <a:off x="914399" y="3872758"/>
-              <a:ext cx="968189" cy="523220"/>
-              <a:chOff x="914399" y="4975412"/>
-              <a:chExt cx="968189" cy="523220"/>
-            </a:xfrm>
-          </p:grpSpPr>
-          <p:cxnSp>
-            <p:nvCxnSpPr>
-              <p:cNvPr id="13" name="Straight Arrow Connector 12"/>
-              <p:cNvCxnSpPr/>
-              <p:nvPr/>
-            </p:nvCxnSpPr>
-            <p:spPr>
-              <a:xfrm>
-                <a:off x="1290918" y="5230906"/>
-                <a:ext cx="591670" cy="1588"/>
-              </a:xfrm>
-              <a:prstGeom prst="straightConnector1">
-                <a:avLst/>
-              </a:prstGeom>
-              <a:ln w="25400">
-                <a:solidFill>
-                  <a:schemeClr val="tx1"/>
-                </a:solidFill>
-                <a:tailEnd type="stealth" w="lg" len="lg"/>
-              </a:ln>
-            </p:spPr>
-            <p:style>
-              <a:lnRef idx="1">
-                <a:schemeClr val="accent1"/>
-              </a:lnRef>
-              <a:fillRef idx="0">
-                <a:schemeClr val="accent1"/>
-              </a:fillRef>
-              <a:effectRef idx="0">
-                <a:schemeClr val="accent1"/>
-              </a:effectRef>
-              <a:fontRef idx="minor">
-                <a:schemeClr val="tx1"/>
-              </a:fontRef>
-            </p:style>
-          </p:cxnSp>
-          <p:sp>
-            <p:nvSpPr>
-              <p:cNvPr id="17" name="TextBox 16"/>
-              <p:cNvSpPr txBox="1"/>
-              <p:nvPr/>
-            </p:nvSpPr>
-            <p:spPr>
-              <a:xfrm>
-                <a:off x="914399" y="4975412"/>
-                <a:ext cx="447558" cy="523220"/>
-              </a:xfrm>
-              <a:prstGeom prst="rect">
-                <a:avLst/>
-              </a:prstGeom>
-              <a:noFill/>
-            </p:spPr>
-            <p:txBody>
-              <a:bodyPr wrap="none" rtlCol="0">
-                <a:spAutoFit/>
-              </a:bodyPr>
-              <a:lstStyle/>
-              <a:p>
-                <a:r>
-                  <a:rPr lang="en-US" sz="2800" dirty="0" smtClean="0">
-                    <a:latin typeface="Comic Sans MS" pitchFamily="66" charset="0"/>
-                  </a:rPr>
-                  <a:t>A</a:t>
-                </a:r>
-                <a:endParaRPr lang="en-US" sz="2800" dirty="0">
-                  <a:latin typeface="Comic Sans MS" pitchFamily="66" charset="0"/>
-                </a:endParaRPr>
-              </a:p>
-            </p:txBody>
-          </p:sp>
-        </p:grpSp>
-        <p:grpSp>
-          <p:nvGrpSpPr>
-            <p:cNvPr id="4" name="Group 18"/>
-            <p:cNvGrpSpPr/>
-            <p:nvPr/>
-          </p:nvGrpSpPr>
-          <p:grpSpPr>
-            <a:xfrm>
-              <a:off x="918882" y="4616829"/>
-              <a:ext cx="968189" cy="523220"/>
-              <a:chOff x="914399" y="4988859"/>
-              <a:chExt cx="968189" cy="523220"/>
-            </a:xfrm>
-          </p:grpSpPr>
-          <p:cxnSp>
-            <p:nvCxnSpPr>
-              <p:cNvPr id="20" name="Straight Arrow Connector 19"/>
-              <p:cNvCxnSpPr/>
-              <p:nvPr/>
-            </p:nvCxnSpPr>
-            <p:spPr>
-              <a:xfrm>
-                <a:off x="1290918" y="5230906"/>
-                <a:ext cx="591670" cy="1588"/>
-              </a:xfrm>
-              <a:prstGeom prst="straightConnector1">
-                <a:avLst/>
-              </a:prstGeom>
-              <a:ln w="25400">
-                <a:solidFill>
-                  <a:schemeClr val="tx1"/>
-                </a:solidFill>
-                <a:tailEnd type="stealth" w="lg" len="lg"/>
-              </a:ln>
-            </p:spPr>
-            <p:style>
-              <a:lnRef idx="1">
-                <a:schemeClr val="accent1"/>
-              </a:lnRef>
-              <a:fillRef idx="0">
-                <a:schemeClr val="accent1"/>
-              </a:fillRef>
-              <a:effectRef idx="0">
-                <a:schemeClr val="accent1"/>
-              </a:effectRef>
-              <a:fontRef idx="minor">
-                <a:schemeClr val="tx1"/>
-              </a:fontRef>
-            </p:style>
-          </p:cxnSp>
-          <p:sp>
-            <p:nvSpPr>
-              <p:cNvPr id="21" name="TextBox 20"/>
-              <p:cNvSpPr txBox="1"/>
-              <p:nvPr/>
-            </p:nvSpPr>
-            <p:spPr>
-              <a:xfrm>
-                <a:off x="914399" y="4988859"/>
-                <a:ext cx="410690" cy="523220"/>
-              </a:xfrm>
-              <a:prstGeom prst="rect">
-                <a:avLst/>
-              </a:prstGeom>
-              <a:noFill/>
-            </p:spPr>
-            <p:txBody>
-              <a:bodyPr wrap="none" rtlCol="0">
-                <a:spAutoFit/>
-              </a:bodyPr>
-              <a:lstStyle/>
-              <a:p>
-                <a:r>
-                  <a:rPr lang="en-US" sz="2800" dirty="0" smtClean="0">
-                    <a:latin typeface="Comic Sans MS" pitchFamily="66" charset="0"/>
-                  </a:rPr>
-                  <a:t>B</a:t>
-                </a:r>
-                <a:endParaRPr lang="en-US" sz="2800" dirty="0">
-                  <a:latin typeface="Comic Sans MS" pitchFamily="66" charset="0"/>
-                </a:endParaRPr>
-              </a:p>
-            </p:txBody>
-          </p:sp>
-        </p:grpSp>
-      </p:grpSp>
-      <p:grpSp>
-        <p:nvGrpSpPr>
-          <p:cNvPr id="5" name="Group 21"/>
-          <p:cNvGrpSpPr/>
-          <p:nvPr/>
-        </p:nvGrpSpPr>
-        <p:grpSpPr>
-          <a:xfrm>
-            <a:off x="3546659" y="3444412"/>
-            <a:ext cx="1025341" cy="584775"/>
-            <a:chOff x="857247" y="4945995"/>
-            <a:chExt cx="1025341" cy="584775"/>
-          </a:xfrm>
-        </p:grpSpPr>
-        <p:cxnSp>
-          <p:nvCxnSpPr>
-            <p:cNvPr id="23" name="Straight Arrow Connector 22"/>
-            <p:cNvCxnSpPr/>
-            <p:nvPr/>
-          </p:nvCxnSpPr>
-          <p:spPr>
-            <a:xfrm>
-              <a:off x="1290918" y="5230906"/>
-              <a:ext cx="591670" cy="1588"/>
-            </a:xfrm>
-            <a:prstGeom prst="straightConnector1">
-              <a:avLst/>
-            </a:prstGeom>
-            <a:ln w="25400">
-              <a:solidFill>
-                <a:schemeClr val="tx1"/>
-              </a:solidFill>
-              <a:tailEnd type="stealth" w="lg" len="lg"/>
-            </a:ln>
-          </p:spPr>
-          <p:style>
-            <a:lnRef idx="1">
-              <a:schemeClr val="accent1"/>
-            </a:lnRef>
-            <a:fillRef idx="0">
-              <a:schemeClr val="accent1"/>
-            </a:fillRef>
-            <a:effectRef idx="0">
-              <a:schemeClr val="accent1"/>
-            </a:effectRef>
-            <a:fontRef idx="minor">
-              <a:schemeClr val="tx1"/>
-            </a:fontRef>
-          </p:style>
-        </p:cxnSp>
-        <p:sp>
-          <p:nvSpPr>
-            <p:cNvPr id="24" name="TextBox 23"/>
-            <p:cNvSpPr txBox="1"/>
-            <p:nvPr/>
-          </p:nvSpPr>
-          <p:spPr>
-            <a:xfrm>
-              <a:off x="857247" y="4945995"/>
-              <a:ext cx="615874" cy="584775"/>
-            </a:xfrm>
-            <a:prstGeom prst="rect">
-              <a:avLst/>
-            </a:prstGeom>
-            <a:noFill/>
-          </p:spPr>
-          <p:txBody>
-            <a:bodyPr wrap="none" rtlCol="0">
-              <a:spAutoFit/>
-            </a:bodyPr>
-            <a:lstStyle/>
-            <a:p>
-              <a:r>
-                <a:rPr lang="en-US" sz="3200" dirty="0" err="1" smtClean="0">
-                  <a:latin typeface="Comic Sans MS" pitchFamily="66" charset="0"/>
-                </a:rPr>
-                <a:t>c</a:t>
-              </a:r>
-              <a:r>
-                <a:rPr lang="en-US" sz="3200" baseline="-25000" dirty="0" err="1" smtClean="0">
-                  <a:latin typeface="Comic Sans MS" pitchFamily="66" charset="0"/>
-                </a:rPr>
-                <a:t>in</a:t>
-              </a:r>
-              <a:endParaRPr lang="en-US" sz="3200" baseline="-25000" dirty="0">
-                <a:latin typeface="Comic Sans MS" pitchFamily="66" charset="0"/>
-              </a:endParaRPr>
-            </a:p>
-          </p:txBody>
-        </p:sp>
-      </p:grpSp>
-      <p:cxnSp>
-        <p:nvCxnSpPr>
-          <p:cNvPr id="27" name="Elbow Connector 26"/>
-          <p:cNvCxnSpPr/>
-          <p:nvPr/>
-        </p:nvCxnSpPr>
-        <p:spPr>
-          <a:xfrm flipV="1">
-            <a:off x="3200400" y="4262718"/>
-            <a:ext cx="3711388" cy="847170"/>
-          </a:xfrm>
-          <a:prstGeom prst="bentConnector3">
-            <a:avLst>
-              <a:gd name="adj1" fmla="val 91576"/>
-            </a:avLst>
-          </a:prstGeom>
-          <a:ln w="25400">
-            <a:solidFill>
-              <a:schemeClr val="tx1"/>
-            </a:solidFill>
-            <a:tailEnd type="stealth" w="lg" len="lg"/>
-          </a:ln>
-        </p:spPr>
-        <p:style>
-          <a:lnRef idx="1">
-            <a:schemeClr val="accent1"/>
-          </a:lnRef>
-          <a:fillRef idx="0">
-            <a:schemeClr val="accent1"/>
-          </a:fillRef>
-          <a:effectRef idx="0">
-            <a:schemeClr val="accent1"/>
-          </a:effectRef>
-          <a:fontRef idx="minor">
-            <a:schemeClr val="tx1"/>
-          </a:fontRef>
-        </p:style>
-      </p:cxnSp>
-      <p:cxnSp>
-        <p:nvCxnSpPr>
-          <p:cNvPr id="30" name="Elbow Connector 29"/>
-          <p:cNvCxnSpPr/>
-          <p:nvPr/>
-        </p:nvCxnSpPr>
-        <p:spPr>
-          <a:xfrm flipV="1">
-            <a:off x="5921188" y="3886200"/>
-            <a:ext cx="963706" cy="784416"/>
-          </a:xfrm>
-          <a:prstGeom prst="bentConnector3">
-            <a:avLst>
-              <a:gd name="adj1" fmla="val 50000"/>
-            </a:avLst>
-          </a:prstGeom>
-          <a:ln w="25400">
-            <a:solidFill>
-              <a:schemeClr val="tx1"/>
-            </a:solidFill>
-            <a:tailEnd type="stealth" w="lg" len="lg"/>
-          </a:ln>
-        </p:spPr>
-        <p:style>
-          <a:lnRef idx="1">
-            <a:schemeClr val="accent1"/>
-          </a:lnRef>
-          <a:fillRef idx="0">
-            <a:schemeClr val="accent1"/>
-          </a:fillRef>
-          <a:effectRef idx="0">
-            <a:schemeClr val="accent1"/>
-          </a:effectRef>
-          <a:fontRef idx="minor">
-            <a:schemeClr val="tx1"/>
-          </a:fontRef>
-        </p:style>
-      </p:cxnSp>
-      <p:cxnSp>
-        <p:nvCxnSpPr>
-          <p:cNvPr id="33" name="Elbow Connector 32"/>
-          <p:cNvCxnSpPr/>
-          <p:nvPr/>
-        </p:nvCxnSpPr>
-        <p:spPr>
-          <a:xfrm flipV="1">
-            <a:off x="5934635" y="3267640"/>
-            <a:ext cx="2066365" cy="515471"/>
-          </a:xfrm>
-          <a:prstGeom prst="bentConnector3">
-            <a:avLst>
-              <a:gd name="adj1" fmla="val 7701"/>
-            </a:avLst>
-          </a:prstGeom>
-          <a:ln w="25400">
-            <a:solidFill>
-              <a:schemeClr val="tx1"/>
-            </a:solidFill>
-            <a:tailEnd type="stealth" w="lg" len="lg"/>
-          </a:ln>
-        </p:spPr>
-        <p:style>
-          <a:lnRef idx="1">
-            <a:schemeClr val="accent1"/>
-          </a:lnRef>
-          <a:fillRef idx="0">
-            <a:schemeClr val="accent1"/>
-          </a:fillRef>
-          <a:effectRef idx="0">
-            <a:schemeClr val="accent1"/>
-          </a:effectRef>
-          <a:fontRef idx="minor">
-            <a:schemeClr val="tx1"/>
-          </a:fontRef>
-        </p:style>
-      </p:cxnSp>
-      <p:sp>
-        <p:nvSpPr>
-          <p:cNvPr id="39" name="TextBox 38"/>
-          <p:cNvSpPr txBox="1"/>
-          <p:nvPr/>
-        </p:nvSpPr>
-        <p:spPr>
-          <a:xfrm>
-            <a:off x="8001000" y="2998699"/>
-            <a:ext cx="425116" cy="584775"/>
-          </a:xfrm>
-          <a:prstGeom prst="rect">
-            <a:avLst/>
-          </a:prstGeom>
-          <a:noFill/>
-        </p:spPr>
-        <p:txBody>
-          <a:bodyPr wrap="none" rtlCol="0">
-            <a:spAutoFit/>
-          </a:bodyPr>
-          <a:lstStyle/>
-          <a:p>
-            <a:r>
-              <a:rPr lang="en-US" sz="3200" dirty="0" smtClean="0">
-                <a:latin typeface="Comic Sans MS" pitchFamily="66" charset="0"/>
-              </a:rPr>
-              <a:t>d</a:t>
-            </a:r>
-            <a:endParaRPr lang="en-US" sz="3200" dirty="0">
-              <a:latin typeface="Comic Sans MS" pitchFamily="66" charset="0"/>
-            </a:endParaRPr>
-          </a:p>
-        </p:txBody>
-      </p:sp>
-      <p:sp>
-        <p:nvSpPr>
-          <p:cNvPr id="40" name="TextBox 39"/>
-          <p:cNvSpPr txBox="1"/>
-          <p:nvPr/>
-        </p:nvSpPr>
-        <p:spPr>
-          <a:xfrm rot="10800000" flipV="1">
-            <a:off x="8032373" y="3777688"/>
-            <a:ext cx="854452" cy="594286"/>
+            <a:off x="459546" y="1675812"/>
+            <a:ext cx="8481254" cy="3416320"/>
           </a:xfrm>
           <a:prstGeom prst="rect">
             <a:avLst/>
@@ -9135,380 +7552,171 @@
           </a:bodyPr>
           <a:lstStyle/>
           <a:p>
-            <a:r>
-              <a:rPr lang="en-US" sz="3200" dirty="0" err="1" smtClean="0">
+            <a:pPr algn="l"/>
+            <a:r>
+              <a:rPr lang="en-US" sz="4400" i="1" dirty="0" smtClean="0">
+                <a:latin typeface="Comic Sans MS"/>
+                <a:cs typeface="Comic Sans MS"/>
+              </a:rPr>
+              <a:t>Lemma:</a:t>
+            </a:r>
+            <a:r>
+              <a:rPr lang="en-US" sz="4800" dirty="0" smtClean="0">
+                <a:latin typeface="Comic Sans MS"/>
+                <a:cs typeface="Comic Sans MS"/>
+              </a:rPr>
+              <a:t> </a:t>
+            </a:r>
+            <a:r>
+              <a:rPr lang="en-US" sz="5400" dirty="0" smtClean="0">
+                <a:latin typeface="Comic Sans MS"/>
+                <a:cs typeface="Comic Sans MS"/>
+              </a:rPr>
+              <a:t>A rule is sound </a:t>
+            </a:r>
+            <a:r>
+              <a:rPr lang="en-US" sz="5400" dirty="0" err="1" smtClean="0">
+                <a:latin typeface="Comic Sans MS"/>
+                <a:cs typeface="Comic Sans MS"/>
+              </a:rPr>
+              <a:t>iff</a:t>
+            </a:r>
+            <a:endParaRPr lang="en-US" sz="5400" dirty="0" smtClean="0">
+              <a:latin typeface="Comic Sans MS"/>
+              <a:cs typeface="Comic Sans MS"/>
+            </a:endParaRPr>
+          </a:p>
+          <a:p>
+            <a:pPr algn="l"/>
+            <a:r>
+              <a:rPr lang="en-US" sz="4800" dirty="0" smtClean="0">
+                <a:solidFill>
+                  <a:schemeClr val="accent1">
+                    <a:lumMod val="50000"/>
+                  </a:schemeClr>
+                </a:solidFill>
+                <a:latin typeface="Comic Sans MS"/>
+                <a:cs typeface="Comic Sans MS"/>
+              </a:rPr>
+              <a:t> </a:t>
+            </a:r>
+            <a:r>
+              <a:rPr lang="en-US" sz="4800" dirty="0" smtClean="0">
+                <a:solidFill>
+                  <a:srgbClr val="0000FF"/>
+                </a:solidFill>
+                <a:latin typeface="Comic Sans MS"/>
+                <a:cs typeface="Comic Sans MS"/>
+              </a:rPr>
+              <a:t>AND</a:t>
+            </a:r>
+            <a:r>
+              <a:rPr lang="en-US" sz="5400" dirty="0" smtClean="0">
+                <a:solidFill>
+                  <a:srgbClr val="0000FF"/>
+                </a:solidFill>
+                <a:latin typeface="Comic Sans MS"/>
+                <a:cs typeface="Comic Sans MS"/>
+              </a:rPr>
+              <a:t>{Antecedents}</a:t>
+            </a:r>
+          </a:p>
+          <a:p>
+            <a:pPr algn="l"/>
+            <a:r>
+              <a:rPr lang="en-US" sz="5400" dirty="0">
+                <a:solidFill>
+                  <a:srgbClr val="0000FF"/>
+                </a:solidFill>
+                <a:latin typeface="Comic Sans MS"/>
+                <a:cs typeface="Comic Sans MS"/>
+                <a:sym typeface="Euclid Symbol"/>
+              </a:rPr>
+              <a:t> </a:t>
+            </a:r>
+            <a:r>
+              <a:rPr lang="en-US" sz="5400" dirty="0" smtClean="0">
+                <a:solidFill>
+                  <a:srgbClr val="0000FF"/>
+                </a:solidFill>
+                <a:latin typeface="Comic Sans MS"/>
+                <a:cs typeface="Comic Sans MS"/>
+                <a:sym typeface="Euclid Symbol"/>
+              </a:rPr>
+              <a:t>       </a:t>
+            </a:r>
+            <a:r>
+              <a:rPr lang="en-US" sz="4800" dirty="0" smtClean="0">
+                <a:solidFill>
+                  <a:srgbClr val="0000FF"/>
+                </a:solidFill>
+                <a:latin typeface="Comic Sans MS"/>
+                <a:cs typeface="Comic Sans MS"/>
+                <a:sym typeface="Euclid Symbol"/>
+              </a:rPr>
+              <a:t>IMPLIES</a:t>
+            </a:r>
+            <a:r>
+              <a:rPr lang="en-US" sz="5400" dirty="0" smtClean="0">
+                <a:solidFill>
+                  <a:srgbClr val="0000FF"/>
+                </a:solidFill>
+                <a:latin typeface="cmsy10"/>
+                <a:sym typeface="Euclid Symbol"/>
+              </a:rPr>
+              <a:t> </a:t>
+            </a:r>
+            <a:r>
+              <a:rPr lang="en-US" sz="5400" dirty="0" smtClean="0">
+                <a:solidFill>
+                  <a:srgbClr val="0000FF"/>
+                </a:solidFill>
+                <a:latin typeface="Comic Sans MS" pitchFamily="66" charset="0"/>
+                <a:sym typeface="Euclid Symbol"/>
+              </a:rPr>
+              <a:t>Conclusion</a:t>
+            </a:r>
+          </a:p>
+          <a:p>
+            <a:pPr algn="l"/>
+            <a:r>
+              <a:rPr lang="en-US" sz="5400" dirty="0" smtClean="0">
                 <a:latin typeface="Comic Sans MS" pitchFamily="66" charset="0"/>
               </a:rPr>
-              <a:t>c</a:t>
-            </a:r>
-            <a:r>
-              <a:rPr lang="en-US" sz="3200" baseline="-25000" dirty="0" err="1" smtClean="0">
+              <a:t>is </a:t>
+            </a:r>
+            <a:r>
+              <a:rPr lang="en-US" sz="5400" dirty="0" smtClean="0">
+                <a:solidFill>
+                  <a:srgbClr val="006600"/>
+                </a:solidFill>
                 <a:latin typeface="Comic Sans MS" pitchFamily="66" charset="0"/>
               </a:rPr>
-              <a:t>out</a:t>
-            </a:r>
-            <a:endParaRPr lang="en-US" sz="3200" baseline="-25000" dirty="0">
-              <a:latin typeface="Comic Sans MS" pitchFamily="66" charset="0"/>
-            </a:endParaRPr>
-          </a:p>
-        </p:txBody>
-      </p:sp>
-      <p:sp>
-        <p:nvSpPr>
-          <p:cNvPr id="42" name="Flowchart: Stored Data 41"/>
-          <p:cNvSpPr/>
-          <p:nvPr/>
-        </p:nvSpPr>
-        <p:spPr>
-          <a:xfrm rot="10800000">
-            <a:off x="6844553" y="3751733"/>
-            <a:ext cx="793376" cy="658902"/>
-          </a:xfrm>
-          <a:prstGeom prst="flowChartOnlineStorage">
-            <a:avLst/>
-          </a:prstGeom>
-          <a:noFill/>
-          <a:ln>
-            <a:solidFill>
-              <a:schemeClr val="tx1"/>
-            </a:solidFill>
-          </a:ln>
-        </p:spPr>
-        <p:style>
-          <a:lnRef idx="2">
-            <a:schemeClr val="accent1">
-              <a:shade val="50000"/>
-            </a:schemeClr>
-          </a:lnRef>
-          <a:fillRef idx="1">
-            <a:schemeClr val="accent1"/>
-          </a:fillRef>
-          <a:effectRef idx="0">
-            <a:schemeClr val="accent1"/>
-          </a:effectRef>
-          <a:fontRef idx="minor">
-            <a:schemeClr val="lt1"/>
-          </a:fontRef>
-        </p:style>
-        <p:txBody>
-          <a:bodyPr rtlCol="0" anchor="ctr"/>
-          <a:lstStyle/>
-          <a:p>
-            <a:pPr algn="ctr"/>
-            <a:endParaRPr lang="en-US" sz="2800"/>
-          </a:p>
-        </p:txBody>
-      </p:sp>
-      <p:cxnSp>
-        <p:nvCxnSpPr>
-          <p:cNvPr id="44" name="Straight Arrow Connector 43"/>
-          <p:cNvCxnSpPr>
-            <a:stCxn id="42" idx="1"/>
-            <a:endCxn id="40" idx="3"/>
-          </p:cNvCxnSpPr>
-          <p:nvPr/>
-        </p:nvCxnSpPr>
-        <p:spPr>
-          <a:xfrm flipV="1">
-            <a:off x="7637929" y="4074831"/>
-            <a:ext cx="394444" cy="6353"/>
-          </a:xfrm>
-          <a:prstGeom prst="straightConnector1">
-            <a:avLst/>
-          </a:prstGeom>
-          <a:ln w="25400">
-            <a:solidFill>
-              <a:schemeClr val="tx1"/>
-            </a:solidFill>
-            <a:tailEnd type="stealth" w="lg" len="lg"/>
-          </a:ln>
-        </p:spPr>
-        <p:style>
-          <a:lnRef idx="1">
-            <a:schemeClr val="accent1"/>
-          </a:lnRef>
-          <a:fillRef idx="0">
-            <a:schemeClr val="accent1"/>
-          </a:fillRef>
-          <a:effectRef idx="0">
-            <a:schemeClr val="accent1"/>
-          </a:effectRef>
-          <a:fontRef idx="minor">
-            <a:schemeClr val="tx1"/>
-          </a:fontRef>
-        </p:style>
-      </p:cxnSp>
-      <p:sp>
-        <p:nvSpPr>
-          <p:cNvPr id="47" name="TextBox 46"/>
-          <p:cNvSpPr txBox="1"/>
-          <p:nvPr/>
-        </p:nvSpPr>
-        <p:spPr>
-          <a:xfrm>
-            <a:off x="3477790" y="5782235"/>
-            <a:ext cx="2066591" cy="584775"/>
-          </a:xfrm>
-          <a:prstGeom prst="rect">
-            <a:avLst/>
-          </a:prstGeom>
-          <a:noFill/>
-        </p:spPr>
-        <p:txBody>
-          <a:bodyPr wrap="none" rtlCol="0">
-            <a:spAutoFit/>
-          </a:bodyPr>
-          <a:lstStyle/>
-          <a:p>
-            <a:r>
-              <a:rPr lang="en-US" sz="3200" dirty="0" smtClean="0">
+              <a:t>valid</a:t>
+            </a:r>
+            <a:r>
+              <a:rPr lang="en-US" sz="5400" dirty="0" smtClean="0">
                 <a:latin typeface="Comic Sans MS" pitchFamily="66" charset="0"/>
               </a:rPr>
-              <a:t>full adder</a:t>
-            </a:r>
-            <a:endParaRPr lang="en-US" sz="3200" dirty="0">
-              <a:latin typeface="Comic Sans MS" pitchFamily="66" charset="0"/>
-            </a:endParaRPr>
+              <a:t>.</a:t>
+            </a:r>
           </a:p>
         </p:txBody>
       </p:sp>
-      <p:cxnSp>
-        <p:nvCxnSpPr>
-          <p:cNvPr id="55" name="Straight Arrow Connector 54"/>
-          <p:cNvCxnSpPr/>
-          <p:nvPr/>
-        </p:nvCxnSpPr>
-        <p:spPr>
-          <a:xfrm>
-            <a:off x="3213847" y="4410635"/>
-            <a:ext cx="1358153" cy="1588"/>
-          </a:xfrm>
-          <a:prstGeom prst="straightConnector1">
-            <a:avLst/>
-          </a:prstGeom>
-          <a:ln w="25400">
-            <a:solidFill>
-              <a:schemeClr val="tx1"/>
-            </a:solidFill>
-            <a:tailEnd type="stealth" w="lg" len="lg"/>
-          </a:ln>
-        </p:spPr>
-        <p:style>
-          <a:lnRef idx="1">
-            <a:schemeClr val="accent1"/>
-          </a:lnRef>
-          <a:fillRef idx="0">
-            <a:schemeClr val="accent1"/>
-          </a:fillRef>
-          <a:effectRef idx="0">
-            <a:schemeClr val="accent1"/>
-          </a:effectRef>
-          <a:fontRef idx="minor">
-            <a:schemeClr val="tx1"/>
-          </a:fontRef>
-        </p:style>
-      </p:cxnSp>
-      <p:sp>
-        <p:nvSpPr>
-          <p:cNvPr id="28" name="TextBox 27"/>
-          <p:cNvSpPr txBox="1"/>
-          <p:nvPr/>
-        </p:nvSpPr>
-        <p:spPr>
-          <a:xfrm rot="10800000" flipV="1">
-            <a:off x="3755655" y="4301985"/>
-            <a:ext cx="444869" cy="584775"/>
-          </a:xfrm>
-          <a:prstGeom prst="rect">
-            <a:avLst/>
-          </a:prstGeom>
-          <a:noFill/>
-        </p:spPr>
-        <p:txBody>
-          <a:bodyPr wrap="square" rtlCol="0">
-            <a:spAutoFit/>
-          </a:bodyPr>
-          <a:lstStyle/>
-          <a:p>
-            <a:r>
-              <a:rPr lang="en-US" dirty="0" smtClean="0">
-                <a:latin typeface="Comic Sans MS" pitchFamily="66" charset="0"/>
-              </a:rPr>
-              <a:t>s</a:t>
-            </a:r>
-            <a:endParaRPr lang="en-US" sz="3200" baseline="-25000" dirty="0">
-              <a:latin typeface="Comic Sans MS" pitchFamily="66" charset="0"/>
-            </a:endParaRPr>
-          </a:p>
-        </p:txBody>
-      </p:sp>
-      <p:sp>
-        <p:nvSpPr>
-          <p:cNvPr id="29" name="TextBox 28"/>
-          <p:cNvSpPr txBox="1"/>
-          <p:nvPr/>
-        </p:nvSpPr>
-        <p:spPr>
-          <a:xfrm rot="10800000" flipV="1">
-            <a:off x="3779469" y="4989570"/>
-            <a:ext cx="444876" cy="584775"/>
-          </a:xfrm>
-          <a:prstGeom prst="rect">
-            <a:avLst/>
-          </a:prstGeom>
-          <a:noFill/>
-        </p:spPr>
-        <p:txBody>
-          <a:bodyPr wrap="square" rtlCol="0">
-            <a:spAutoFit/>
-          </a:bodyPr>
-          <a:lstStyle/>
-          <a:p>
-            <a:r>
-              <a:rPr lang="en-US" dirty="0" smtClean="0">
-                <a:latin typeface="Comic Sans MS" pitchFamily="66" charset="0"/>
-              </a:rPr>
-              <a:t>c</a:t>
-            </a:r>
-            <a:endParaRPr lang="en-US" sz="3200" baseline="-25000" dirty="0">
-              <a:latin typeface="Comic Sans MS" pitchFamily="66" charset="0"/>
-            </a:endParaRPr>
-          </a:p>
-        </p:txBody>
-      </p:sp>
-      <p:sp>
-        <p:nvSpPr>
-          <p:cNvPr id="31" name="Slide Number Placeholder 2"/>
-          <p:cNvSpPr txBox="1">
-            <a:spLocks/>
-          </p:cNvSpPr>
-          <p:nvPr/>
-        </p:nvSpPr>
-        <p:spPr bwMode="auto">
-          <a:xfrm>
-            <a:off x="8006885" y="6540057"/>
-            <a:ext cx="1082523" cy="276999"/>
-          </a:xfrm>
-          <a:prstGeom prst="rect">
-            <a:avLst/>
-          </a:prstGeom>
-          <a:noFill/>
-          <a:ln w="9525">
-            <a:noFill/>
-            <a:miter lim="800000"/>
-            <a:headEnd/>
-            <a:tailEnd/>
-          </a:ln>
-          <a:effectLst/>
-        </p:spPr>
-        <p:txBody>
-          <a:bodyPr vert="horz" wrap="none" lIns="91440" tIns="45720" rIns="91440" bIns="45720" numCol="1" anchor="t" anchorCtr="0" compatLnSpc="1">
-            <a:prstTxWarp prst="textNoShape">
-              <a:avLst/>
-            </a:prstTxWarp>
-            <a:spAutoFit/>
-          </a:bodyPr>
-          <a:lstStyle/>
-          <a:p>
-            <a:pPr marL="0" marR="0" lvl="0" indent="0" algn="r" defTabSz="914400" rtl="0" eaLnBrk="1" fontAlgn="base" latinLnBrk="0" hangingPunct="1">
-              <a:lnSpc>
-                <a:spcPct val="100000"/>
-              </a:lnSpc>
-              <a:spcBef>
-                <a:spcPct val="0"/>
-              </a:spcBef>
-              <a:spcAft>
-                <a:spcPct val="0"/>
-              </a:spcAft>
-              <a:buClrTx/>
-              <a:buSzTx/>
-              <a:buFontTx/>
-              <a:buNone/>
-              <a:tabLst/>
-              <a:defRPr/>
-            </a:pPr>
-            <a:r>
-              <a:rPr kumimoji="0" lang="en-US" sz="1200" b="0" i="0" u="none" strike="noStrike" kern="1200" cap="none" spc="0" normalizeH="0" baseline="0" noProof="0" dirty="0" smtClean="0">
-                <a:ln>
-                  <a:noFill/>
-                </a:ln>
-                <a:solidFill>
-                  <a:schemeClr val="tx1"/>
-                </a:solidFill>
-                <a:effectLst/>
-                <a:uLnTx/>
-                <a:uFillTx/>
-                <a:latin typeface="Comic Sans MS" pitchFamily="66" charset="0"/>
-                <a:ea typeface="+mn-ea"/>
-                <a:cs typeface="+mn-cs"/>
-              </a:rPr>
-              <a:t>IMPLIES.</a:t>
-            </a:r>
-            <a:fld id="{0150943C-9303-41DF-A6FA-7E32D6C5D18E}" type="slidenum">
-              <a:rPr kumimoji="0" lang="en-US" sz="1200" b="0" i="0" u="none" strike="noStrike" kern="1200" cap="none" spc="0" normalizeH="0" baseline="0" noProof="0" smtClean="0">
-                <a:ln>
-                  <a:noFill/>
-                </a:ln>
-                <a:solidFill>
-                  <a:schemeClr val="tx1"/>
-                </a:solidFill>
-                <a:effectLst/>
-                <a:uLnTx/>
-                <a:uFillTx/>
-                <a:latin typeface="Comic Sans MS" pitchFamily="66" charset="0"/>
-                <a:ea typeface="+mn-ea"/>
-                <a:cs typeface="+mn-cs"/>
-              </a:rPr>
-              <a:pPr marL="0" marR="0" lvl="0" indent="0" algn="r" defTabSz="914400" rtl="0" eaLnBrk="1" fontAlgn="base" latinLnBrk="0" hangingPunct="1">
-                <a:lnSpc>
-                  <a:spcPct val="100000"/>
-                </a:lnSpc>
-                <a:spcBef>
-                  <a:spcPct val="0"/>
-                </a:spcBef>
-                <a:spcAft>
-                  <a:spcPct val="0"/>
-                </a:spcAft>
-                <a:buClrTx/>
-                <a:buSzTx/>
-                <a:buFontTx/>
-                <a:buNone/>
-                <a:tabLst/>
-                <a:defRPr/>
-              </a:pPr>
-              <a:t>15</a:t>
-            </a:fld>
-            <a:endParaRPr kumimoji="0" lang="en-US" sz="1200" b="0" i="0" u="none" strike="noStrike" kern="1200" cap="none" spc="0" normalizeH="0" baseline="0" noProof="0" dirty="0" smtClean="0">
-              <a:ln>
-                <a:noFill/>
-              </a:ln>
-              <a:solidFill>
-                <a:schemeClr val="tx1"/>
-              </a:solidFill>
-              <a:effectLst/>
-              <a:uLnTx/>
-              <a:uFillTx/>
-              <a:latin typeface="Comic Sans MS" pitchFamily="66" charset="0"/>
-              <a:ea typeface="+mn-ea"/>
-              <a:cs typeface="+mn-cs"/>
-            </a:endParaRPr>
-          </a:p>
-        </p:txBody>
-      </p:sp>
-      <p:sp>
-        <p:nvSpPr>
-          <p:cNvPr id="35" name="Title 1"/>
+      <p:sp>
+        <p:nvSpPr>
+          <p:cNvPr id="4" name="Slide Number Placeholder 2"/>
           <p:cNvSpPr>
             <a:spLocks noGrp="1"/>
           </p:cNvSpPr>
           <p:nvPr>
-            <p:ph type="title"/>
+            <p:ph type="sldNum" sz="quarter" idx="10"/>
           </p:nvPr>
         </p:nvSpPr>
         <p:spPr>
           <a:xfrm>
-            <a:off x="2401623" y="276412"/>
-            <a:ext cx="4354015" cy="951886"/>
+            <a:off x="8086124" y="6553200"/>
+            <a:ext cx="1057877" cy="276999"/>
           </a:xfrm>
         </p:spPr>
         <p:txBody>
@@ -9516,89 +7724,29 @@
           <a:lstStyle/>
           <a:p>
             <a:r>
-              <a:rPr lang="en-US" sz="4000" dirty="0" smtClean="0"/>
-              <a:t>Digital Logic</a:t>
-            </a:r>
-            <a:endParaRPr lang="en-US" sz="4000" dirty="0"/>
+              <a:rPr lang="en-US" dirty="0" smtClean="0"/>
+              <a:t>IMPLIES.</a:t>
+            </a:r>
+            <a:fld id="{3251DA95-B240-47FE-901D-B78FC8E8E532}" type="slidenum">
+              <a:rPr lang="en-US" smtClean="0"/>
+              <a:pPr/>
+              <a:t>12</a:t>
+            </a:fld>
+            <a:endParaRPr lang="en-US" dirty="0"/>
           </a:p>
         </p:txBody>
       </p:sp>
-      <p:graphicFrame>
-        <p:nvGraphicFramePr>
-          <p:cNvPr id="32" name="Object 31"/>
-          <p:cNvGraphicFramePr>
-            <a:graphicFrameLocks noChangeAspect="1"/>
-          </p:cNvGraphicFramePr>
-          <p:nvPr>
-            <p:extLst>
-              <p:ext uri="{D42A27DB-BD31-4B8C-83A1-F6EECF244321}">
-                <p14:modId xmlns:p14="http://schemas.microsoft.com/office/powerpoint/2010/main" val="3321774446"/>
-              </p:ext>
-            </p:extLst>
-          </p:nvPr>
-        </p:nvGraphicFramePr>
-        <p:xfrm>
-          <a:off x="1941513" y="1076325"/>
-          <a:ext cx="5303837" cy="1814513"/>
-        </p:xfrm>
-        <a:graphic>
-          <a:graphicData uri="http://schemas.openxmlformats.org/presentationml/2006/ole">
-            <mc:AlternateContent xmlns:mc="http://schemas.openxmlformats.org/markup-compatibility/2006">
-              <mc:Choice xmlns:v="urn:schemas-microsoft-com:vml" Requires="v">
-                <p:oleObj spid="_x0000_s401471" name="Equation" r:id="rId4" imgW="3784600" imgH="1295400" progId="Equation.DSMT4">
-                  <p:embed/>
-                </p:oleObj>
-              </mc:Choice>
-              <mc:Fallback>
-                <p:oleObj name="Equation" r:id="rId4" imgW="3784600" imgH="1295400" progId="Equation.DSMT4">
-                  <p:embed/>
-                  <p:pic>
-                    <p:nvPicPr>
-                      <p:cNvPr id="0" name="Picture 2"/>
-                      <p:cNvPicPr>
-                        <a:picLocks noChangeAspect="1" noChangeArrowheads="1"/>
-                      </p:cNvPicPr>
-                      <p:nvPr/>
-                    </p:nvPicPr>
-                    <p:blipFill>
-                      <a:blip r:embed="rId5"/>
-                      <a:srcRect/>
-                      <a:stretch>
-                        <a:fillRect/>
-                      </a:stretch>
-                    </p:blipFill>
-                    <p:spPr bwMode="auto">
-                      <a:xfrm>
-                        <a:off x="1941513" y="1076325"/>
-                        <a:ext cx="5303837" cy="1814513"/>
-                      </a:xfrm>
-                      <a:prstGeom prst="rect">
-                        <a:avLst/>
-                      </a:prstGeom>
-                      <a:noFill/>
-                      <a:extLst>
-                        <a:ext uri="{909E8E84-426E-40dd-AFC4-6F175D3DCCD1}">
-                          <a14:hiddenFill xmlns:a14="http://schemas.microsoft.com/office/drawing/2010/main">
-                            <a:solidFill>
-                              <a:srgbClr val="FFFFFF"/>
-                            </a:solidFill>
-                          </a14:hiddenFill>
-                        </a:ext>
-                      </a:extLst>
-                    </p:spPr>
-                  </p:pic>
-                </p:oleObj>
-              </mc:Fallback>
-            </mc:AlternateContent>
-          </a:graphicData>
-        </a:graphic>
-      </p:graphicFrame>
     </p:spTree>
+    <p:extLst>
+      <p:ext uri="{BB962C8B-B14F-4D97-AF65-F5344CB8AC3E}">
+        <p14:creationId xmlns:p14="http://schemas.microsoft.com/office/powerpoint/2010/main" val="998713355"/>
+      </p:ext>
+    </p:extLst>
   </p:cSld>
   <p:clrMapOvr>
     <a:masterClrMapping/>
   </p:clrMapOvr>
-  <p:transition xmlns:p14="http://schemas.microsoft.com/office/powerpoint/2010/main">
+  <p:transition xmlns:p14="http://schemas.microsoft.com/office/powerpoint/2010/main" spd="slow" advClick="0">
     <p:fade/>
   </p:transition>
   <p:timing>
@@ -11054,8 +9202,8 @@
   <p:clrMapOvr>
     <a:masterClrMapping/>
   </p:clrMapOvr>
-  <p:transition xmlns:p14="http://schemas.microsoft.com/office/powerpoint/2010/main">
-    <p:fade thruBlk="1"/>
+  <p:transition xmlns:p14="http://schemas.microsoft.com/office/powerpoint/2010/main" spd="slow" advClick="0">
+    <p:fade/>
   </p:transition>
   <p:timing>
     <p:tnLst>
@@ -11091,7 +9239,7 @@
                                           </p:stCondLst>
                                         </p:cTn>
                                         <p:tgtEl>
-                                          <p:spTgt spid="23"/>
+                                          <p:spTgt spid="24"/>
                                         </p:tgtEl>
                                         <p:attrNameLst>
                                           <p:attrName>style.visibility</p:attrName>
@@ -11105,59 +9253,6 @@
                                       <p:cBhvr>
                                         <p:cTn id="7" dur="500"/>
                                         <p:tgtEl>
-                                          <p:spTgt spid="23"/>
-                                        </p:tgtEl>
-                                      </p:cBhvr>
-                                    </p:animEffect>
-                                  </p:childTnLst>
-                                </p:cTn>
-                              </p:par>
-                            </p:childTnLst>
-                          </p:cTn>
-                        </p:par>
-                      </p:childTnLst>
-                    </p:cTn>
-                  </p:par>
-                  <p:par>
-                    <p:cTn id="8" fill="hold">
-                      <p:stCondLst>
-                        <p:cond delay="indefinite"/>
-                      </p:stCondLst>
-                      <p:childTnLst>
-                        <p:par>
-                          <p:cTn id="9" fill="hold">
-                            <p:stCondLst>
-                              <p:cond delay="0"/>
-                            </p:stCondLst>
-                            <p:childTnLst>
-                              <p:par>
-                                <p:cTn id="10" presetID="9" presetClass="entr" presetSubtype="0" fill="hold" grpId="0" nodeType="clickEffect">
-                                  <p:stCondLst>
-                                    <p:cond delay="0"/>
-                                  </p:stCondLst>
-                                  <p:childTnLst>
-                                    <p:set>
-                                      <p:cBhvr>
-                                        <p:cTn id="11" dur="1" fill="hold">
-                                          <p:stCondLst>
-                                            <p:cond delay="0"/>
-                                          </p:stCondLst>
-                                        </p:cTn>
-                                        <p:tgtEl>
-                                          <p:spTgt spid="24"/>
-                                        </p:tgtEl>
-                                        <p:attrNameLst>
-                                          <p:attrName>style.visibility</p:attrName>
-                                        </p:attrNameLst>
-                                      </p:cBhvr>
-                                      <p:to>
-                                        <p:strVal val="visible"/>
-                                      </p:to>
-                                    </p:set>
-                                    <p:animEffect transition="in" filter="dissolve">
-                                      <p:cBhvr>
-                                        <p:cTn id="12" dur="500"/>
-                                        <p:tgtEl>
                                           <p:spTgt spid="24"/>
                                         </p:tgtEl>
                                       </p:cBhvr>
@@ -11169,20 +9264,20 @@
                           </p:cTn>
                         </p:par>
                         <p:par>
-                          <p:cTn id="13" fill="hold">
+                          <p:cTn id="8" fill="hold">
                             <p:stCondLst>
                               <p:cond delay="500"/>
                             </p:stCondLst>
                             <p:childTnLst>
                               <p:par>
-                                <p:cTn id="14" presetID="22" presetClass="entr" presetSubtype="1" fill="hold" nodeType="afterEffect">
+                                <p:cTn id="9" presetID="22" presetClass="entr" presetSubtype="1" fill="hold" nodeType="afterEffect">
                                   <p:stCondLst>
                                     <p:cond delay="0"/>
                                   </p:stCondLst>
                                   <p:childTnLst>
                                     <p:set>
                                       <p:cBhvr>
-                                        <p:cTn id="15" dur="1" fill="hold">
+                                        <p:cTn id="10" dur="1" fill="hold">
                                           <p:stCondLst>
                                             <p:cond delay="0"/>
                                           </p:stCondLst>
@@ -11200,7 +9295,7 @@
                                     </p:set>
                                     <p:animEffect transition="in" filter="wipe(up)">
                                       <p:cBhvr>
-                                        <p:cTn id="16" dur="1000"/>
+                                        <p:cTn id="11" dur="1000"/>
                                         <p:tgtEl>
                                           <p:spTgt spid="22"/>
                                         </p:tgtEl>
@@ -11216,26 +9311,26 @@
                     </p:cTn>
                   </p:par>
                   <p:par>
-                    <p:cTn id="17" fill="hold">
+                    <p:cTn id="12" fill="hold">
                       <p:stCondLst>
                         <p:cond delay="indefinite"/>
                       </p:stCondLst>
                       <p:childTnLst>
                         <p:par>
-                          <p:cTn id="18" fill="hold">
+                          <p:cTn id="13" fill="hold">
                             <p:stCondLst>
                               <p:cond delay="0"/>
                             </p:stCondLst>
                             <p:childTnLst>
                               <p:par>
-                                <p:cTn id="19" presetID="37" presetClass="entr" presetSubtype="0" fill="hold" grpId="0" nodeType="clickEffect">
+                                <p:cTn id="14" presetID="37" presetClass="entr" presetSubtype="0" fill="hold" grpId="0" nodeType="clickEffect">
                                   <p:stCondLst>
                                     <p:cond delay="0"/>
                                   </p:stCondLst>
                                   <p:childTnLst>
                                     <p:set>
                                       <p:cBhvr>
-                                        <p:cTn id="20" dur="1" fill="hold">
+                                        <p:cTn id="15" dur="1" fill="hold">
                                           <p:stCondLst>
                                             <p:cond delay="0"/>
                                           </p:stCondLst>
@@ -11253,7 +9348,7 @@
                                     </p:set>
                                     <p:animEffect transition="in" filter="fade">
                                       <p:cBhvr>
-                                        <p:cTn id="21" dur="1000"/>
+                                        <p:cTn id="16" dur="1000"/>
                                         <p:tgtEl>
                                           <p:spTgt spid="11"/>
                                         </p:tgtEl>
@@ -11261,7 +9356,7 @@
                                     </p:animEffect>
                                     <p:anim calcmode="lin" valueType="num">
                                       <p:cBhvr>
-                                        <p:cTn id="22" dur="1000" fill="hold"/>
+                                        <p:cTn id="17" dur="1000" fill="hold"/>
                                         <p:tgtEl>
                                           <p:spTgt spid="11"/>
                                         </p:tgtEl>
@@ -11284,7 +9379,7 @@
                                     </p:anim>
                                     <p:anim calcmode="lin" valueType="num">
                                       <p:cBhvr>
-                                        <p:cTn id="23" dur="900" decel="100000" fill="hold"/>
+                                        <p:cTn id="18" dur="900" decel="100000" fill="hold"/>
                                         <p:tgtEl>
                                           <p:spTgt spid="11"/>
                                         </p:tgtEl>
@@ -11307,7 +9402,7 @@
                                     </p:anim>
                                     <p:anim calcmode="lin" valueType="num">
                                       <p:cBhvr>
-                                        <p:cTn id="24" dur="100" accel="100000" fill="hold">
+                                        <p:cTn id="19" dur="100" accel="100000" fill="hold">
                                           <p:stCondLst>
                                             <p:cond delay="900"/>
                                           </p:stCondLst>
@@ -11363,7 +9458,6 @@
       </p:par>
     </p:tnLst>
     <p:bldLst>
-      <p:bldP spid="23" grpId="0"/>
       <p:bldP spid="24" grpId="0"/>
       <p:bldP spid="11" grpId="0" animBg="1"/>
     </p:bldLst>
@@ -11560,8 +9654,8 @@
   <p:clrMapOvr>
     <a:masterClrMapping/>
   </p:clrMapOvr>
-  <p:transition xmlns:p14="http://schemas.microsoft.com/office/powerpoint/2010/main">
-    <p:fade thruBlk="1"/>
+  <p:transition xmlns:p14="http://schemas.microsoft.com/office/powerpoint/2010/main" spd="slow" advClick="0">
+    <p:fade/>
   </p:transition>
   <p:timing>
     <p:tnLst>
@@ -11584,7 +9678,7 @@
                             </p:stCondLst>
                             <p:childTnLst>
                               <p:par>
-                                <p:cTn id="5" presetID="1" presetClass="entr" presetSubtype="0" fill="hold" nodeType="clickEffect">
+                                <p:cTn id="5" presetID="9" presetClass="entr" presetSubtype="0" fill="hold" grpId="0" nodeType="clickEffect">
                                   <p:stCondLst>
                                     <p:cond delay="0"/>
                                   </p:stCondLst>
@@ -11611,18 +9705,30 @@
                                         <p:strVal val="visible"/>
                                       </p:to>
                                     </p:set>
+                                    <p:animEffect transition="in" filter="dissolve">
+                                      <p:cBhvr>
+                                        <p:cTn id="7" dur="500"/>
+                                        <p:tgtEl>
+                                          <p:spTgt spid="5">
+                                            <p:txEl>
+                                              <p:pRg st="1" end="1"/>
+                                            </p:txEl>
+                                          </p:spTgt>
+                                        </p:tgtEl>
+                                      </p:cBhvr>
+                                    </p:animEffect>
                                   </p:childTnLst>
                                 </p:cTn>
                               </p:par>
                               <p:par>
-                                <p:cTn id="7" presetID="1" presetClass="entr" presetSubtype="0" fill="hold" nodeType="withEffect">
+                                <p:cTn id="8" presetID="9" presetClass="entr" presetSubtype="0" fill="hold" grpId="0" nodeType="withEffect">
                                   <p:stCondLst>
                                     <p:cond delay="0"/>
                                   </p:stCondLst>
                                   <p:childTnLst>
                                     <p:set>
                                       <p:cBhvr>
-                                        <p:cTn id="8" dur="1" fill="hold">
+                                        <p:cTn id="9" dur="1" fill="hold">
                                           <p:stCondLst>
                                             <p:cond delay="0"/>
                                           </p:stCondLst>
@@ -11642,6 +9748,18 @@
                                         <p:strVal val="visible"/>
                                       </p:to>
                                     </p:set>
+                                    <p:animEffect transition="in" filter="dissolve">
+                                      <p:cBhvr>
+                                        <p:cTn id="10" dur="500"/>
+                                        <p:tgtEl>
+                                          <p:spTgt spid="5">
+                                            <p:txEl>
+                                              <p:pRg st="2" end="2"/>
+                                            </p:txEl>
+                                          </p:spTgt>
+                                        </p:tgtEl>
+                                      </p:cBhvr>
+                                    </p:animEffect>
                                   </p:childTnLst>
                                 </p:cTn>
                               </p:par>
@@ -11672,6 +9790,9 @@
         </p:cTn>
       </p:par>
     </p:tnLst>
+    <p:bldLst>
+      <p:bldP spid="5" grpId="0" build="allAtOnce"/>
+    </p:bldLst>
   </p:timing>
 </p:sld>
 </file>
@@ -11983,7 +10104,7 @@
   <p:clrMapOvr>
     <a:masterClrMapping/>
   </p:clrMapOvr>
-  <p:transition xmlns:p14="http://schemas.microsoft.com/office/powerpoint/2010/main">
+  <p:transition xmlns:p14="http://schemas.microsoft.com/office/powerpoint/2010/main" spd="slow" advClick="0">
     <p:fade/>
   </p:transition>
   <p:timing>
@@ -12268,7 +10389,7 @@
   <p:clrMapOvr>
     <a:masterClrMapping/>
   </p:clrMapOvr>
-  <p:transition xmlns:p14="http://schemas.microsoft.com/office/powerpoint/2010/main" spd="slow" advTm="0">
+  <p:transition xmlns:p14="http://schemas.microsoft.com/office/powerpoint/2010/main" spd="slow" advClick="0">
     <p:fade/>
   </p:transition>
   <p:timing>
@@ -12594,7 +10715,7 @@
   <p:clrMapOvr>
     <a:masterClrMapping/>
   </p:clrMapOvr>
-  <p:transition xmlns:p14="http://schemas.microsoft.com/office/powerpoint/2010/main" spd="slow">
+  <p:transition xmlns:p14="http://schemas.microsoft.com/office/powerpoint/2010/main" spd="slow" advClick="0">
     <p:fade/>
   </p:transition>
   <p:timing>
@@ -12910,7 +11031,7 @@
   <p:clrMapOvr>
     <a:masterClrMapping/>
   </p:clrMapOvr>
-  <p:transition xmlns:p14="http://schemas.microsoft.com/office/powerpoint/2010/main" spd="slow">
+  <p:transition xmlns:p14="http://schemas.microsoft.com/office/powerpoint/2010/main" spd="slow" advClick="0">
     <p:fade/>
   </p:transition>
   <p:timing>
@@ -13083,18 +11204,9 @@
   <p:clrMapOvr>
     <a:masterClrMapping/>
   </p:clrMapOvr>
-  <mc:AlternateContent xmlns:mc="http://schemas.openxmlformats.org/markup-compatibility/2006" xmlns:p14="http://schemas.microsoft.com/office/powerpoint/2010/main">
-    <mc:Choice Requires="p14">
-      <p:transition spd="slow" p14:dur="1100">
-        <p:fade thruBlk="1"/>
-      </p:transition>
-    </mc:Choice>
-    <mc:Fallback xmlns="">
-      <p:transition xmlns:p14="http://schemas.microsoft.com/office/powerpoint/2010/main" spd="slow">
-        <p:fade thruBlk="1"/>
-      </p:transition>
-    </mc:Fallback>
-  </mc:AlternateContent>
+  <p:transition xmlns:p14="http://schemas.microsoft.com/office/powerpoint/2010/main" spd="slow" advClick="0">
+    <p:fade thruBlk="1"/>
+  </p:transition>
   <p:timing>
     <p:tnLst>
       <p:par>
@@ -13213,7 +11325,7 @@
           <a:graphicData uri="http://schemas.openxmlformats.org/presentationml/2006/ole">
             <mc:AlternateContent xmlns:mc="http://schemas.openxmlformats.org/markup-compatibility/2006">
               <mc:Choice xmlns:v="urn:schemas-microsoft-com:vml" Requires="v">
-                <p:oleObj spid="_x0000_s1058" name="Equation" r:id="rId3" imgW="1181100" imgH="495300" progId="Equation.DSMT4">
+                <p:oleObj spid="_x0000_s1078" name="Equation" r:id="rId3" imgW="1181100" imgH="495300" progId="Equation.DSMT4">
                   <p:embed/>
                 </p:oleObj>
               </mc:Choice>
@@ -13257,20 +11369,20 @@
           <p:nvPr>
             <p:extLst>
               <p:ext uri="{D42A27DB-BD31-4B8C-83A1-F6EECF244321}">
-                <p14:modId xmlns:p14="http://schemas.microsoft.com/office/powerpoint/2010/main" val="3768623414"/>
+                <p14:modId xmlns:p14="http://schemas.microsoft.com/office/powerpoint/2010/main" val="2134282266"/>
               </p:ext>
             </p:extLst>
           </p:nvPr>
         </p:nvGraphicFramePr>
         <p:xfrm>
-          <a:off x="1505999" y="896409"/>
+          <a:off x="1453060" y="663576"/>
           <a:ext cx="5658909" cy="3396925"/>
         </p:xfrm>
         <a:graphic>
           <a:graphicData uri="http://schemas.openxmlformats.org/presentationml/2006/ole">
             <mc:AlternateContent xmlns:mc="http://schemas.openxmlformats.org/markup-compatibility/2006">
               <mc:Choice xmlns:v="urn:schemas-microsoft-com:vml" Requires="v">
-                <p:oleObj spid="_x0000_s1059" name="Equation" r:id="rId5" imgW="762000" imgH="457200" progId="Equation.DSMT4">
+                <p:oleObj spid="_x0000_s1079" name="Equation" r:id="rId5" imgW="762000" imgH="457200" progId="Equation.DSMT4">
                   <p:embed/>
                 </p:oleObj>
               </mc:Choice>
@@ -13291,7 +11403,7 @@
                     </p:blipFill>
                     <p:spPr>
                       <a:xfrm>
-                        <a:off x="1505999" y="896409"/>
+                        <a:off x="1453060" y="663576"/>
                         <a:ext cx="5658909" cy="3396925"/>
                       </a:xfrm>
                       <a:prstGeom prst="rect">
@@ -13327,7 +11439,7 @@
           <a:graphicData uri="http://schemas.openxmlformats.org/presentationml/2006/ole">
             <mc:AlternateContent xmlns:mc="http://schemas.openxmlformats.org/markup-compatibility/2006">
               <mc:Choice xmlns:v="urn:schemas-microsoft-com:vml" Requires="v">
-                <p:oleObj spid="_x0000_s1060" name="Equation" r:id="rId7" imgW="444500" imgH="431800" progId="Equation.DSMT4">
+                <p:oleObj spid="_x0000_s1080" name="Equation" r:id="rId7" imgW="444500" imgH="431800" progId="Equation.DSMT4">
                   <p:embed/>
                 </p:oleObj>
               </mc:Choice>
@@ -13372,18 +11484,9 @@
   <p:clrMapOvr>
     <a:masterClrMapping/>
   </p:clrMapOvr>
-  <mc:AlternateContent xmlns:mc="http://schemas.openxmlformats.org/markup-compatibility/2006" xmlns:p14="http://schemas.microsoft.com/office/powerpoint/2010/main">
-    <mc:Choice Requires="p14">
-      <p:transition spd="slow" p14:dur="900">
-        <p:fade/>
-      </p:transition>
-    </mc:Choice>
-    <mc:Fallback xmlns="">
-      <p:transition xmlns:p14="http://schemas.microsoft.com/office/powerpoint/2010/main" spd="slow">
-        <p:fade/>
-      </p:transition>
-    </mc:Fallback>
-  </mc:AlternateContent>
+  <p:transition xmlns:p14="http://schemas.microsoft.com/office/powerpoint/2010/main" spd="slow" advClick="0">
+    <p:fade/>
+  </p:transition>
   <p:timing>
     <p:tnLst>
       <p:par>
@@ -13483,7 +11586,7 @@
                                     </p:set>
                                     <p:animEffect transition="in" filter="wipe(down)">
                                       <p:cBhvr>
-                                        <p:cTn id="12" dur="500"/>
+                                        <p:cTn id="12" dur="1000"/>
                                         <p:tgtEl>
                                           <p:spTgt spid="7"/>
                                         </p:tgtEl>

</xml_diff>

<commit_message>
minor edits propositional pptx's
</commit_message>
<xml_diff>
--- a/spring14/slidesS14/implies.pptx
+++ b/spring14/slidesS14/implies.pptx
@@ -26,7 +26,7 @@
     <p:sldId id="488" r:id="rId14"/>
   </p:sldIdLst>
   <p:sldSz cx="9144000" cy="6858000" type="screen4x3"/>
-  <p:notesSz cx="7315200" cy="9601200"/>
+  <p:notesSz cx="9601200" cy="7315200"/>
   <p:custDataLst>
     <p:tags r:id="rId18"/>
   </p:custDataLst>
@@ -196,7 +196,7 @@
         <p:spPr bwMode="auto">
           <a:xfrm>
             <a:off x="0" y="0"/>
-            <a:ext cx="3170238" cy="479425"/>
+            <a:ext cx="4160937" cy="365276"/>
           </a:xfrm>
           <a:prstGeom prst="rect">
             <a:avLst/>
@@ -241,8 +241,8 @@
         </p:nvSpPr>
         <p:spPr bwMode="auto">
           <a:xfrm>
-            <a:off x="4143375" y="0"/>
-            <a:ext cx="3170238" cy="479425"/>
+            <a:off x="5438180" y="0"/>
+            <a:ext cx="4160937" cy="365276"/>
           </a:xfrm>
           <a:prstGeom prst="rect">
             <a:avLst/>
@@ -287,8 +287,8 @@
         </p:nvSpPr>
         <p:spPr bwMode="auto">
           <a:xfrm>
-            <a:off x="0" y="9120188"/>
-            <a:ext cx="3170238" cy="479425"/>
+            <a:off x="0" y="6948715"/>
+            <a:ext cx="4160937" cy="365276"/>
           </a:xfrm>
           <a:prstGeom prst="rect">
             <a:avLst/>
@@ -333,8 +333,8 @@
         </p:nvSpPr>
         <p:spPr bwMode="auto">
           <a:xfrm>
-            <a:off x="4143375" y="9120188"/>
-            <a:ext cx="3170238" cy="479425"/>
+            <a:off x="5438180" y="6948715"/>
+            <a:ext cx="4160937" cy="365276"/>
           </a:xfrm>
           <a:prstGeom prst="rect">
             <a:avLst/>
@@ -423,7 +423,7 @@
         <p:spPr bwMode="auto">
           <a:xfrm>
             <a:off x="0" y="0"/>
-            <a:ext cx="3170238" cy="479425"/>
+            <a:ext cx="4160937" cy="365276"/>
           </a:xfrm>
           <a:prstGeom prst="rect">
             <a:avLst/>
@@ -468,8 +468,8 @@
         </p:nvSpPr>
         <p:spPr bwMode="auto">
           <a:xfrm>
-            <a:off x="4144963" y="0"/>
-            <a:ext cx="3170237" cy="479425"/>
+            <a:off x="5440265" y="0"/>
+            <a:ext cx="4160936" cy="365276"/>
           </a:xfrm>
           <a:prstGeom prst="rect">
             <a:avLst/>
@@ -514,8 +514,8 @@
         </p:nvSpPr>
         <p:spPr bwMode="auto">
           <a:xfrm>
-            <a:off x="1257300" y="720725"/>
-            <a:ext cx="4800600" cy="3600450"/>
+            <a:off x="2971800" y="549275"/>
+            <a:ext cx="3657600" cy="2743200"/>
           </a:xfrm>
           <a:prstGeom prst="rect">
             <a:avLst/>
@@ -543,8 +543,8 @@
         </p:nvSpPr>
         <p:spPr bwMode="auto">
           <a:xfrm>
-            <a:off x="974725" y="4560888"/>
-            <a:ext cx="5365750" cy="4319587"/>
+            <a:off x="1279327" y="3474963"/>
+            <a:ext cx="7042547" cy="3291114"/>
           </a:xfrm>
           <a:prstGeom prst="rect">
             <a:avLst/>
@@ -614,8 +614,8 @@
         </p:nvSpPr>
         <p:spPr bwMode="auto">
           <a:xfrm>
-            <a:off x="0" y="9121775"/>
-            <a:ext cx="3170238" cy="479425"/>
+            <a:off x="0" y="6949924"/>
+            <a:ext cx="4160937" cy="365276"/>
           </a:xfrm>
           <a:prstGeom prst="rect">
             <a:avLst/>
@@ -660,8 +660,8 @@
         </p:nvSpPr>
         <p:spPr bwMode="auto">
           <a:xfrm>
-            <a:off x="4144963" y="9121775"/>
-            <a:ext cx="3170237" cy="479425"/>
+            <a:off x="5440265" y="6949924"/>
+            <a:ext cx="4160936" cy="365276"/>
           </a:xfrm>
           <a:prstGeom prst="rect">
             <a:avLst/>
@@ -5281,13 +5281,19 @@
               <a:rPr lang="en-US" sz="1100" baseline="0" dirty="0" smtClean="0">
                 <a:latin typeface="Comic Sans MS" pitchFamily="66" charset="0"/>
               </a:rPr>
-              <a:t>February 15</a:t>
+              <a:t>February </a:t>
+            </a:r>
+            <a:r>
+              <a:rPr lang="en-US" sz="1100" baseline="0" dirty="0" smtClean="0">
+                <a:latin typeface="Comic Sans MS" pitchFamily="66" charset="0"/>
+              </a:rPr>
+              <a:t>14</a:t>
             </a:r>
             <a:r>
               <a:rPr lang="en-US" sz="1100" dirty="0" smtClean="0">
                 <a:latin typeface="Comic Sans MS" pitchFamily="66" charset="0"/>
               </a:rPr>
-              <a:t>, 2013</a:t>
+              <a:t>, 2014</a:t>
             </a:r>
             <a:endParaRPr lang="en-US" sz="1100" dirty="0">
               <a:latin typeface="Comic Sans MS" pitchFamily="66" charset="0"/>
@@ -7140,11 +7146,6 @@
               </a:rPr>
               <a:t>true</a:t>
             </a:r>
-            <a:endParaRPr lang="en-US" sz="5400" dirty="0" smtClean="0">
-              <a:solidFill>
-                <a:srgbClr val="008000"/>
-              </a:solidFill>
-            </a:endParaRPr>
           </a:p>
           <a:p>
             <a:r>
@@ -11325,7 +11326,7 @@
           <a:graphicData uri="http://schemas.openxmlformats.org/presentationml/2006/ole">
             <mc:AlternateContent xmlns:mc="http://schemas.openxmlformats.org/markup-compatibility/2006">
               <mc:Choice xmlns:v="urn:schemas-microsoft-com:vml" Requires="v">
-                <p:oleObj spid="_x0000_s1078" name="Equation" r:id="rId3" imgW="1181100" imgH="495300" progId="Equation.DSMT4">
+                <p:oleObj spid="_x0000_s1086" name="Equation" r:id="rId3" imgW="1181100" imgH="495300" progId="Equation.DSMT4">
                   <p:embed/>
                 </p:oleObj>
               </mc:Choice>
@@ -11382,7 +11383,7 @@
           <a:graphicData uri="http://schemas.openxmlformats.org/presentationml/2006/ole">
             <mc:AlternateContent xmlns:mc="http://schemas.openxmlformats.org/markup-compatibility/2006">
               <mc:Choice xmlns:v="urn:schemas-microsoft-com:vml" Requires="v">
-                <p:oleObj spid="_x0000_s1079" name="Equation" r:id="rId5" imgW="762000" imgH="457200" progId="Equation.DSMT4">
+                <p:oleObj spid="_x0000_s1087" name="Equation" r:id="rId5" imgW="762000" imgH="457200" progId="Equation.DSMT4">
                   <p:embed/>
                 </p:oleObj>
               </mc:Choice>
@@ -11439,7 +11440,7 @@
           <a:graphicData uri="http://schemas.openxmlformats.org/presentationml/2006/ole">
             <mc:AlternateContent xmlns:mc="http://schemas.openxmlformats.org/markup-compatibility/2006">
               <mc:Choice xmlns:v="urn:schemas-microsoft-com:vml" Requires="v">
-                <p:oleObj spid="_x0000_s1080" name="Equation" r:id="rId7" imgW="444500" imgH="431800" progId="Equation.DSMT4">
+                <p:oleObj spid="_x0000_s1088" name="Equation" r:id="rId7" imgW="444500" imgH="431800" progId="Equation.DSMT4">
                   <p:embed/>
                 </p:oleObj>
               </mc:Choice>

</xml_diff>